<commit_message>
Modif de la présenttion
</commit_message>
<xml_diff>
--- a/Trucs_utiles/Presentation/Projet SE3A.pptx
+++ b/Trucs_utiles/Presentation/Projet SE3A.pptx
@@ -552,13 +552,6 @@
   <p:clrMapOvr>
     <a:masterClrMapping/>
   </p:clrMapOvr>
-  <p:timing>
-    <p:tnLst>
-      <p:par>
-        <p:cTn id="1" dur="indefinite" restart="never" nodeType="tmRoot"/>
-      </p:par>
-    </p:tnLst>
-  </p:timing>
 </p:sldLayout>
 </file>
 
@@ -713,10 +706,9 @@
           </a:lstStyle>
           <a:p>
             <a:r>
-              <a:rPr lang="fr-FR" smtClean="0"/>
+              <a:rPr lang="fr-FR"/>
               <a:t>Cliquez sur l'icône pour ajouter une image</a:t>
             </a:r>
-            <a:endParaRPr lang="fr-FR"/>
           </a:p>
         </p:txBody>
       </p:sp>
@@ -785,7 +777,7 @@
           <a:p>
             <a:pPr lvl="0"/>
             <a:r>
-              <a:rPr lang="fr-FR" smtClean="0"/>
+              <a:rPr lang="fr-FR"/>
               <a:t>Modifier les styles du texte du masque</a:t>
             </a:r>
           </a:p>
@@ -980,13 +972,6 @@
   <p:clrMapOvr>
     <a:masterClrMapping/>
   </p:clrMapOvr>
-  <p:timing>
-    <p:tnLst>
-      <p:par>
-        <p:cTn id="1" dur="indefinite" restart="never" nodeType="tmRoot"/>
-      </p:par>
-    </p:tnLst>
-  </p:timing>
 </p:sldLayout>
 </file>
 
@@ -1270,13 +1255,6 @@
   <p:clrMapOvr>
     <a:masterClrMapping/>
   </p:clrMapOvr>
-  <p:timing>
-    <p:tnLst>
-      <p:par>
-        <p:cTn id="1" dur="indefinite" restart="never" nodeType="tmRoot"/>
-      </p:par>
-    </p:tnLst>
-  </p:timing>
 </p:sldLayout>
 </file>
 
@@ -1499,13 +1477,6 @@
   <p:clrMapOvr>
     <a:masterClrMapping/>
   </p:clrMapOvr>
-  <p:timing>
-    <p:tnLst>
-      <p:par>
-        <p:cTn id="1" dur="indefinite" restart="never" nodeType="tmRoot"/>
-      </p:par>
-    </p:tnLst>
-  </p:timing>
 </p:sldLayout>
 </file>
 
@@ -1834,13 +1805,6 @@
   <p:clrMapOvr>
     <a:masterClrMapping/>
   </p:clrMapOvr>
-  <p:timing>
-    <p:tnLst>
-      <p:par>
-        <p:cTn id="1" dur="indefinite" restart="never" nodeType="tmRoot"/>
-      </p:par>
-    </p:tnLst>
-  </p:timing>
 </p:sldLayout>
 </file>
 
@@ -1978,7 +1942,7 @@
           <a:p>
             <a:pPr lvl="0"/>
             <a:r>
-              <a:rPr lang="fr-FR" smtClean="0"/>
+              <a:rPr lang="fr-FR"/>
               <a:t>Modifier les styles du texte du masque</a:t>
             </a:r>
           </a:p>
@@ -2035,7 +1999,7 @@
               <a:buNone/>
             </a:pPr>
             <a:r>
-              <a:rPr lang="fr-FR" smtClean="0"/>
+              <a:rPr lang="fr-FR"/>
               <a:t>Modifier les styles du texte du masque</a:t>
             </a:r>
           </a:p>
@@ -2325,13 +2289,6 @@
   <p:clrMapOvr>
     <a:masterClrMapping/>
   </p:clrMapOvr>
-  <p:timing>
-    <p:tnLst>
-      <p:par>
-        <p:cTn id="1" dur="indefinite" restart="never" nodeType="tmRoot"/>
-      </p:par>
-    </p:tnLst>
-  </p:timing>
 </p:sldLayout>
 </file>
 
@@ -2745,10 +2702,9 @@
           </a:lstStyle>
           <a:p>
             <a:r>
-              <a:rPr lang="fr-FR" smtClean="0"/>
+              <a:rPr lang="fr-FR"/>
               <a:t>Cliquez sur l'icône pour ajouter un graphique</a:t>
             </a:r>
-            <a:endParaRPr lang="fr-FR"/>
           </a:p>
         </p:txBody>
       </p:sp>
@@ -2796,10 +2752,9 @@
           </a:lstStyle>
           <a:p>
             <a:r>
-              <a:rPr lang="fr-FR" smtClean="0"/>
+              <a:rPr lang="fr-FR"/>
               <a:t>Cliquez sur l'icône pour ajouter un graphique</a:t>
             </a:r>
-            <a:endParaRPr lang="fr-FR"/>
           </a:p>
         </p:txBody>
       </p:sp>
@@ -2813,13 +2768,6 @@
   <p:clrMapOvr>
     <a:masterClrMapping/>
   </p:clrMapOvr>
-  <p:timing>
-    <p:tnLst>
-      <p:par>
-        <p:cTn id="1" dur="indefinite" restart="never" nodeType="tmRoot"/>
-      </p:par>
-    </p:tnLst>
-  </p:timing>
 </p:sldLayout>
 </file>
 
@@ -3061,13 +3009,6 @@
   <p:clrMapOvr>
     <a:masterClrMapping/>
   </p:clrMapOvr>
-  <p:timing>
-    <p:tnLst>
-      <p:par>
-        <p:cTn id="1" dur="indefinite" restart="never" nodeType="tmRoot"/>
-      </p:par>
-    </p:tnLst>
-  </p:timing>
 </p:sldLayout>
 </file>
 
@@ -3202,13 +3143,6 @@
   <p:clrMapOvr>
     <a:masterClrMapping/>
   </p:clrMapOvr>
-  <p:timing>
-    <p:tnLst>
-      <p:par>
-        <p:cTn id="1" dur="indefinite" restart="never" nodeType="tmRoot"/>
-      </p:par>
-    </p:tnLst>
-  </p:timing>
 </p:sldLayout>
 </file>
 
@@ -3282,7 +3216,7 @@
               <a:buNone/>
             </a:pPr>
             <a:r>
-              <a:rPr lang="fr-FR" smtClean="0"/>
+              <a:rPr lang="fr-FR"/>
               <a:t>Modifier les styles du texte du masque</a:t>
             </a:r>
           </a:p>
@@ -3581,10 +3515,9 @@
           </a:lstStyle>
           <a:p>
             <a:r>
-              <a:rPr lang="fr-FR" smtClean="0"/>
+              <a:rPr lang="fr-FR"/>
               <a:t>Cliquez sur l'icône pour ajouter un tableau</a:t>
             </a:r>
-            <a:endParaRPr lang="fr-FR"/>
           </a:p>
         </p:txBody>
       </p:sp>
@@ -3598,13 +3531,6 @@
   <p:clrMapOvr>
     <a:masterClrMapping/>
   </p:clrMapOvr>
-  <p:timing>
-    <p:tnLst>
-      <p:par>
-        <p:cTn id="1" dur="indefinite" restart="never" nodeType="tmRoot"/>
-      </p:par>
-    </p:tnLst>
-  </p:timing>
 </p:sldLayout>
 </file>
 
@@ -3777,13 +3703,6 @@
     <p:sldLayoutId id="2147483656" r:id="rId9"/>
     <p:sldLayoutId id="2147483657" r:id="rId10"/>
   </p:sldLayoutIdLst>
-  <p:timing>
-    <p:tnLst>
-      <p:par>
-        <p:cTn id="1" dur="indefinite" restart="never" nodeType="tmRoot"/>
-      </p:par>
-    </p:tnLst>
-  </p:timing>
   <p:txStyles>
     <p:titleStyle>
       <a:lvl1pPr algn="ctr" defTabSz="457200" rtl="0" eaLnBrk="1" latinLnBrk="0" hangingPunct="1">
@@ -4070,10 +3989,9 @@
           <a:lstStyle/>
           <a:p>
             <a:r>
-              <a:rPr lang="fr-FR" dirty="0" smtClean="0"/>
+              <a:rPr lang="fr-FR" dirty="0"/>
               <a:t>Projet SE3A</a:t>
             </a:r>
-            <a:endParaRPr lang="fr-FR" dirty="0"/>
           </a:p>
         </p:txBody>
       </p:sp>
@@ -4093,10 +4011,9 @@
           <a:lstStyle/>
           <a:p>
             <a:r>
-              <a:rPr lang="fr-FR" dirty="0" smtClean="0"/>
-              <a:t>Amélioration du Robot M</a:t>
-            </a:r>
-            <a:endParaRPr lang="fr-FR" dirty="0"/>
+              <a:rPr lang="fr-FR" dirty="0"/>
+              <a:t>Amélioration du Robot MT</a:t>
+            </a:r>
           </a:p>
         </p:txBody>
       </p:sp>
@@ -4110,13 +4027,6 @@
   <p:clrMapOvr>
     <a:masterClrMapping/>
   </p:clrMapOvr>
-  <p:timing>
-    <p:tnLst>
-      <p:par>
-        <p:cTn id="1" dur="indefinite" restart="never" nodeType="tmRoot"/>
-      </p:par>
-    </p:tnLst>
-  </p:timing>
 </p:sld>
 </file>
 
@@ -4153,10 +4063,9 @@
           <a:lstStyle/>
           <a:p>
             <a:r>
-              <a:rPr lang="fr-FR" dirty="0" smtClean="0"/>
+              <a:rPr lang="fr-FR" dirty="0"/>
               <a:t>Etape 2</a:t>
             </a:r>
-            <a:endParaRPr lang="fr-FR" dirty="0"/>
           </a:p>
         </p:txBody>
       </p:sp>
@@ -4181,10 +4090,9 @@
           <a:lstStyle/>
           <a:p>
             <a:r>
-              <a:rPr lang="fr-FR" dirty="0" smtClean="0"/>
+              <a:rPr lang="fr-FR" dirty="0"/>
               <a:t>« mettre un screen de la communication UART console »</a:t>
             </a:r>
-            <a:endParaRPr lang="fr-FR" dirty="0"/>
           </a:p>
         </p:txBody>
       </p:sp>
@@ -4211,11 +4119,11 @@
           <a:lstStyle/>
           <a:p>
             <a:r>
-              <a:rPr lang="fr-FR" dirty="0" smtClean="0"/>
+              <a:rPr lang="fr-FR" dirty="0"/>
               <a:t>Prise en main des outils : communication UART </a:t>
             </a:r>
             <a:r>
-              <a:rPr lang="fr-FR" dirty="0" err="1" smtClean="0"/>
+              <a:rPr lang="fr-FR" dirty="0" err="1"/>
               <a:t>Rasp-Rasp</a:t>
             </a:r>
             <a:endParaRPr lang="fr-FR" dirty="0"/>
@@ -4302,13 +4210,6 @@
   <p:clrMapOvr>
     <a:masterClrMapping/>
   </p:clrMapOvr>
-  <p:timing>
-    <p:tnLst>
-      <p:par>
-        <p:cTn id="1" dur="indefinite" restart="never" nodeType="tmRoot"/>
-      </p:par>
-    </p:tnLst>
-  </p:timing>
 </p:sld>
 </file>
 
@@ -4345,10 +4246,9 @@
           <a:lstStyle/>
           <a:p>
             <a:r>
-              <a:rPr lang="fr-FR" dirty="0" smtClean="0"/>
+              <a:rPr lang="fr-FR" dirty="0"/>
               <a:t>Etape 2</a:t>
             </a:r>
-            <a:endParaRPr lang="fr-FR" dirty="0"/>
           </a:p>
         </p:txBody>
       </p:sp>
@@ -4373,18 +4273,17 @@
           <a:lstStyle/>
           <a:p>
             <a:r>
-              <a:rPr lang="fr-FR" dirty="0" smtClean="0"/>
+              <a:rPr lang="fr-FR" dirty="0"/>
               <a:t>« mettre un screen de la communication UART console </a:t>
             </a:r>
             <a:r>
-              <a:rPr lang="fr-FR" dirty="0" err="1" smtClean="0"/>
+              <a:rPr lang="fr-FR" dirty="0" err="1"/>
               <a:t>rasp</a:t>
             </a:r>
             <a:r>
-              <a:rPr lang="fr-FR" dirty="0" smtClean="0"/>
+              <a:rPr lang="fr-FR" dirty="0"/>
               <a:t>-PIC »</a:t>
             </a:r>
-            <a:endParaRPr lang="fr-FR" dirty="0"/>
           </a:p>
         </p:txBody>
       </p:sp>
@@ -4411,18 +4310,17 @@
           <a:lstStyle/>
           <a:p>
             <a:r>
-              <a:rPr lang="fr-FR" dirty="0" smtClean="0"/>
+              <a:rPr lang="fr-FR" dirty="0"/>
               <a:t>Prise en main des outils : communication UART </a:t>
             </a:r>
             <a:r>
-              <a:rPr lang="fr-FR" dirty="0" err="1" smtClean="0"/>
+              <a:rPr lang="fr-FR" dirty="0" err="1"/>
               <a:t>Rasp</a:t>
             </a:r>
             <a:r>
-              <a:rPr lang="fr-FR" dirty="0" smtClean="0"/>
+              <a:rPr lang="fr-FR" dirty="0"/>
               <a:t>-PIC</a:t>
             </a:r>
-            <a:endParaRPr lang="fr-FR" dirty="0"/>
           </a:p>
         </p:txBody>
       </p:sp>
@@ -4448,13 +4346,6 @@
   <p:clrMapOvr>
     <a:masterClrMapping/>
   </p:clrMapOvr>
-  <p:timing>
-    <p:tnLst>
-      <p:par>
-        <p:cTn id="1" dur="indefinite" restart="never" nodeType="tmRoot"/>
-      </p:par>
-    </p:tnLst>
-  </p:timing>
 </p:sld>
 </file>
 
@@ -4491,10 +4382,9 @@
           <a:lstStyle/>
           <a:p>
             <a:r>
-              <a:rPr lang="fr-FR" dirty="0" smtClean="0"/>
+              <a:rPr lang="fr-FR" dirty="0"/>
               <a:t>Etape 2</a:t>
             </a:r>
-            <a:endParaRPr lang="fr-FR" dirty="0"/>
           </a:p>
         </p:txBody>
       </p:sp>
@@ -4521,10 +4411,9 @@
           <a:lstStyle/>
           <a:p>
             <a:r>
-              <a:rPr lang="fr-FR" dirty="0" smtClean="0"/>
+              <a:rPr lang="fr-FR" dirty="0"/>
               <a:t>Prise en main des outils : Flux vidéo</a:t>
             </a:r>
-            <a:endParaRPr lang="fr-FR" dirty="0"/>
           </a:p>
         </p:txBody>
       </p:sp>
@@ -4544,10 +4433,9 @@
           <a:lstStyle/>
           <a:p>
             <a:r>
-              <a:rPr lang="fr-FR" dirty="0" smtClean="0"/>
+              <a:rPr lang="fr-FR" dirty="0"/>
               <a:t>« Mettre une vidéo d’un chronomètre montrant l’accélération de la camera »</a:t>
             </a:r>
-            <a:endParaRPr lang="fr-FR" dirty="0"/>
           </a:p>
         </p:txBody>
       </p:sp>
@@ -4561,13 +4449,6 @@
   <p:clrMapOvr>
     <a:masterClrMapping/>
   </p:clrMapOvr>
-  <p:timing>
-    <p:tnLst>
-      <p:par>
-        <p:cTn id="1" dur="indefinite" restart="never" nodeType="tmRoot"/>
-      </p:par>
-    </p:tnLst>
-  </p:timing>
 </p:sld>
 </file>
 
@@ -4604,10 +4485,9 @@
           <a:lstStyle/>
           <a:p>
             <a:r>
-              <a:rPr lang="fr-FR" dirty="0" smtClean="0"/>
+              <a:rPr lang="fr-FR" dirty="0"/>
               <a:t>Etape 2</a:t>
             </a:r>
-            <a:endParaRPr lang="fr-FR" dirty="0"/>
           </a:p>
         </p:txBody>
       </p:sp>
@@ -4634,10 +4514,9 @@
           <a:lstStyle/>
           <a:p>
             <a:r>
-              <a:rPr lang="fr-FR" dirty="0" smtClean="0"/>
+              <a:rPr lang="fr-FR" dirty="0"/>
               <a:t>Prise en main des outils : Contrôle moteur</a:t>
             </a:r>
-            <a:endParaRPr lang="fr-FR" dirty="0"/>
           </a:p>
         </p:txBody>
       </p:sp>
@@ -4657,10 +4536,9 @@
           <a:lstStyle/>
           <a:p>
             <a:r>
-              <a:rPr lang="fr-FR" dirty="0" smtClean="0"/>
+              <a:rPr lang="fr-FR" dirty="0"/>
               <a:t>« Mettre une vidéo d’un chronomètre montrant l’accélération de la camera »</a:t>
             </a:r>
-            <a:endParaRPr lang="fr-FR" dirty="0"/>
           </a:p>
         </p:txBody>
       </p:sp>
@@ -4674,13 +4552,6 @@
   <p:clrMapOvr>
     <a:masterClrMapping/>
   </p:clrMapOvr>
-  <p:timing>
-    <p:tnLst>
-      <p:par>
-        <p:cTn id="1" dur="indefinite" restart="never" nodeType="tmRoot"/>
-      </p:par>
-    </p:tnLst>
-  </p:timing>
 </p:sld>
 </file>
 
@@ -4774,10 +4645,9 @@
           <a:lstStyle/>
           <a:p>
             <a:r>
-              <a:rPr lang="fr-FR" dirty="0" smtClean="0"/>
+              <a:rPr lang="fr-FR" dirty="0"/>
               <a:t>Etape</a:t>
             </a:r>
-            <a:endParaRPr lang="fr-FR" dirty="0"/>
           </a:p>
         </p:txBody>
       </p:sp>
@@ -4829,13 +4699,6 @@
   <p:clrMapOvr>
     <a:masterClrMapping/>
   </p:clrMapOvr>
-  <p:timing>
-    <p:tnLst>
-      <p:par>
-        <p:cTn id="1" dur="indefinite" restart="never" nodeType="tmRoot"/>
-      </p:par>
-    </p:tnLst>
-  </p:timing>
 </p:sld>
 </file>
 
@@ -4866,13 +4729,6 @@
   <p:clrMapOvr>
     <a:masterClrMapping/>
   </p:clrMapOvr>
-  <p:timing>
-    <p:tnLst>
-      <p:par>
-        <p:cTn id="1" dur="indefinite" restart="never" nodeType="tmRoot"/>
-      </p:par>
-    </p:tnLst>
-  </p:timing>
 </p:sld>
 </file>
 
@@ -4991,13 +4847,6 @@
   <p:clrMapOvr>
     <a:masterClrMapping/>
   </p:clrMapOvr>
-  <p:timing>
-    <p:tnLst>
-      <p:par>
-        <p:cTn id="1" dur="indefinite" restart="never" nodeType="tmRoot"/>
-      </p:par>
-    </p:tnLst>
-  </p:timing>
 </p:sld>
 </file>
 
@@ -5116,13 +4965,6 @@
   <p:clrMapOvr>
     <a:masterClrMapping/>
   </p:clrMapOvr>
-  <p:timing>
-    <p:tnLst>
-      <p:par>
-        <p:cTn id="1" dur="indefinite" restart="never" nodeType="tmRoot"/>
-      </p:par>
-    </p:tnLst>
-  </p:timing>
 </p:sld>
 </file>
 
@@ -5166,10 +5008,9 @@
           <a:lstStyle/>
           <a:p>
             <a:r>
-              <a:rPr lang="fr-FR" dirty="0" smtClean="0"/>
+              <a:rPr lang="fr-FR" dirty="0"/>
               <a:t>Prise en main du sujet et définition des objectifs</a:t>
             </a:r>
-            <a:endParaRPr lang="fr-FR" dirty="0"/>
           </a:p>
         </p:txBody>
       </p:sp>
@@ -5189,10 +5030,9 @@
           <a:lstStyle/>
           <a:p>
             <a:r>
-              <a:rPr lang="fr-FR" dirty="0" smtClean="0"/>
+              <a:rPr lang="fr-FR" dirty="0"/>
               <a:t>Etape 1</a:t>
             </a:r>
-            <a:endParaRPr lang="fr-FR" dirty="0"/>
           </a:p>
         </p:txBody>
       </p:sp>
@@ -5206,13 +5046,6 @@
   <p:clrMapOvr>
     <a:masterClrMapping/>
   </p:clrMapOvr>
-  <p:timing>
-    <p:tnLst>
-      <p:par>
-        <p:cTn id="1" dur="indefinite" restart="never" nodeType="tmRoot"/>
-      </p:par>
-    </p:tnLst>
-  </p:timing>
 </p:sld>
 </file>
 
@@ -5249,10 +5082,9 @@
           <a:lstStyle/>
           <a:p>
             <a:r>
-              <a:rPr lang="fr-FR" dirty="0" smtClean="0"/>
+              <a:rPr lang="fr-FR" dirty="0"/>
               <a:t>Etape 1</a:t>
             </a:r>
-            <a:endParaRPr lang="fr-FR" dirty="0"/>
           </a:p>
         </p:txBody>
       </p:sp>
@@ -5272,16 +5104,15 @@
           <a:lstStyle/>
           <a:p>
             <a:r>
-              <a:rPr lang="fr-FR" dirty="0" smtClean="0"/>
+              <a:rPr lang="fr-FR" dirty="0"/>
               <a:t>Evaluation des fonctions déjà implémentées dans le robot</a:t>
             </a:r>
           </a:p>
           <a:p>
             <a:r>
-              <a:rPr lang="fr-FR" dirty="0" smtClean="0"/>
+              <a:rPr lang="fr-FR" dirty="0"/>
               <a:t>Evaluation des fonctions à implémenter au cours du projet</a:t>
             </a:r>
-            <a:endParaRPr lang="fr-FR" dirty="0"/>
           </a:p>
         </p:txBody>
       </p:sp>
@@ -5301,10 +5132,9 @@
           <a:lstStyle/>
           <a:p>
             <a:r>
-              <a:rPr lang="fr-FR" dirty="0" smtClean="0"/>
+              <a:rPr lang="fr-FR" dirty="0"/>
               <a:t>Prise en main du sujet</a:t>
             </a:r>
-            <a:endParaRPr lang="fr-FR" dirty="0"/>
           </a:p>
         </p:txBody>
       </p:sp>
@@ -5318,13 +5148,6 @@
   <p:clrMapOvr>
     <a:masterClrMapping/>
   </p:clrMapOvr>
-  <p:timing>
-    <p:tnLst>
-      <p:par>
-        <p:cTn id="1" dur="indefinite" restart="never" nodeType="tmRoot"/>
-      </p:par>
-    </p:tnLst>
-  </p:timing>
 </p:sld>
 </file>
 
@@ -5361,55 +5184,46 @@
           <a:lstStyle/>
           <a:p>
             <a:r>
-              <a:rPr lang="fr-FR" dirty="0" smtClean="0"/>
+              <a:rPr lang="fr-FR" dirty="0"/>
               <a:t>Etape 1</a:t>
             </a:r>
+          </a:p>
+        </p:txBody>
+      </p:sp>
+      <p:sp>
+        <p:nvSpPr>
+          <p:cNvPr id="3" name="Espace réservé du contenu 2"/>
+          <p:cNvSpPr>
+            <a:spLocks noGrp="1"/>
+          </p:cNvSpPr>
+          <p:nvPr>
+            <p:ph idx="1"/>
+          </p:nvPr>
+        </p:nvSpPr>
+        <p:spPr/>
+        <p:txBody>
+          <a:bodyPr/>
+          <a:lstStyle/>
+          <a:p>
+            <a:r>
+              <a:rPr lang="fr-FR" dirty="0"/>
+              <a:t>Algorithme de reconnaissance d’image </a:t>
+            </a:r>
+          </a:p>
+          <a:p>
+            <a:r>
+              <a:rPr lang="fr-FR" dirty="0"/>
+              <a:t>Liaison de la reconnaissance d’image et l’évaluation des distances avec le contrôle moteur</a:t>
+            </a:r>
+          </a:p>
+          <a:p>
+            <a:r>
+              <a:rPr lang="fr-FR" dirty="0"/>
+              <a:t>Algorithme de contrôle des bras</a:t>
+            </a:r>
+          </a:p>
+          <a:p>
             <a:endParaRPr lang="fr-FR" dirty="0"/>
-          </a:p>
-        </p:txBody>
-      </p:sp>
-      <p:sp>
-        <p:nvSpPr>
-          <p:cNvPr id="3" name="Espace réservé du contenu 2"/>
-          <p:cNvSpPr>
-            <a:spLocks noGrp="1"/>
-          </p:cNvSpPr>
-          <p:nvPr>
-            <p:ph idx="1"/>
-          </p:nvPr>
-        </p:nvSpPr>
-        <p:spPr/>
-        <p:txBody>
-          <a:bodyPr/>
-          <a:lstStyle/>
-          <a:p>
-            <a:r>
-              <a:rPr lang="fr-FR" dirty="0" smtClean="0"/>
-              <a:t>Algorithme de reconnaissance d’image </a:t>
-            </a:r>
-          </a:p>
-          <a:p>
-            <a:r>
-              <a:rPr lang="fr-FR" dirty="0" smtClean="0"/>
-              <a:t>Liaison de la reconnaissance d’image </a:t>
-            </a:r>
-            <a:r>
-              <a:rPr lang="fr-FR" dirty="0"/>
-              <a:t>et l’évaluation des distances </a:t>
-            </a:r>
-            <a:r>
-              <a:rPr lang="fr-FR" dirty="0" smtClean="0"/>
-              <a:t>avec le contrôle moteur</a:t>
-            </a:r>
-          </a:p>
-          <a:p>
-            <a:r>
-              <a:rPr lang="fr-FR" dirty="0" smtClean="0"/>
-              <a:t>Algorithme de contrôle des bras</a:t>
-            </a:r>
-          </a:p>
-          <a:p>
-            <a:endParaRPr lang="fr-FR" dirty="0" smtClean="0"/>
           </a:p>
           <a:p>
             <a:endParaRPr lang="fr-FR" dirty="0"/>
@@ -5439,10 +5253,9 @@
           <a:lstStyle/>
           <a:p>
             <a:r>
-              <a:rPr lang="fr-FR" dirty="0" smtClean="0"/>
+              <a:rPr lang="fr-FR" dirty="0"/>
               <a:t>Prise en main du sujet : fonctions à implémenter</a:t>
             </a:r>
-            <a:endParaRPr lang="fr-FR" dirty="0"/>
           </a:p>
         </p:txBody>
       </p:sp>
@@ -5456,13 +5269,6 @@
   <p:clrMapOvr>
     <a:masterClrMapping/>
   </p:clrMapOvr>
-  <p:timing>
-    <p:tnLst>
-      <p:par>
-        <p:cTn id="1" dur="indefinite" restart="never" nodeType="tmRoot"/>
-      </p:par>
-    </p:tnLst>
-  </p:timing>
 </p:sld>
 </file>
 
@@ -5501,10 +5307,9 @@
           <a:lstStyle/>
           <a:p>
             <a:r>
-              <a:rPr lang="fr-FR" dirty="0" smtClean="0"/>
+              <a:rPr lang="fr-FR" dirty="0"/>
               <a:t>Prise en main des outils</a:t>
             </a:r>
-            <a:endParaRPr lang="fr-FR" dirty="0"/>
           </a:p>
         </p:txBody>
       </p:sp>
@@ -5524,10 +5329,9 @@
           <a:lstStyle/>
           <a:p>
             <a:r>
-              <a:rPr lang="fr-FR" dirty="0" smtClean="0"/>
+              <a:rPr lang="fr-FR" dirty="0"/>
               <a:t>Etape 2</a:t>
             </a:r>
-            <a:endParaRPr lang="fr-FR" dirty="0"/>
           </a:p>
         </p:txBody>
       </p:sp>
@@ -5541,13 +5345,6 @@
   <p:clrMapOvr>
     <a:masterClrMapping/>
   </p:clrMapOvr>
-  <p:timing>
-    <p:tnLst>
-      <p:par>
-        <p:cTn id="1" dur="indefinite" restart="never" nodeType="tmRoot"/>
-      </p:par>
-    </p:tnLst>
-  </p:timing>
 </p:sld>
 </file>
 
@@ -5584,57 +5381,52 @@
           <a:lstStyle/>
           <a:p>
             <a:r>
-              <a:rPr lang="fr-FR" dirty="0" smtClean="0"/>
+              <a:rPr lang="fr-FR" dirty="0"/>
               <a:t>Etape 2</a:t>
             </a:r>
+          </a:p>
+        </p:txBody>
+      </p:sp>
+      <p:sp>
+        <p:nvSpPr>
+          <p:cNvPr id="3" name="Espace réservé du contenu 2"/>
+          <p:cNvSpPr>
+            <a:spLocks noGrp="1"/>
+          </p:cNvSpPr>
+          <p:nvPr>
+            <p:ph idx="1"/>
+          </p:nvPr>
+        </p:nvSpPr>
+        <p:spPr/>
+        <p:txBody>
+          <a:bodyPr/>
+          <a:lstStyle/>
+          <a:p>
+            <a:r>
+              <a:rPr lang="fr-FR" dirty="0"/>
+              <a:t>Programme de contrôle moteur</a:t>
+            </a:r>
+          </a:p>
+          <a:p>
+            <a:r>
+              <a:rPr lang="fr-FR" dirty="0"/>
+              <a:t>Algorithme de reconnaissance d’image : Tensorflow</a:t>
+            </a:r>
+          </a:p>
+          <a:p>
+            <a:r>
+              <a:rPr lang="fr-FR" dirty="0"/>
+              <a:t>Communication UART entre raspberry Pi et microcontrôleur PIC</a:t>
+            </a:r>
+          </a:p>
+          <a:p>
+            <a:r>
+              <a:rPr lang="fr-FR" dirty="0"/>
+              <a:t>Récupération du flux vidéo de la camera sur la raspberry Pi</a:t>
+            </a:r>
+          </a:p>
+          <a:p>
             <a:endParaRPr lang="fr-FR" dirty="0"/>
-          </a:p>
-        </p:txBody>
-      </p:sp>
-      <p:sp>
-        <p:nvSpPr>
-          <p:cNvPr id="3" name="Espace réservé du contenu 2"/>
-          <p:cNvSpPr>
-            <a:spLocks noGrp="1"/>
-          </p:cNvSpPr>
-          <p:nvPr>
-            <p:ph idx="1"/>
-          </p:nvPr>
-        </p:nvSpPr>
-        <p:spPr/>
-        <p:txBody>
-          <a:bodyPr/>
-          <a:lstStyle/>
-          <a:p>
-            <a:r>
-              <a:rPr lang="fr-FR" dirty="0"/>
-              <a:t>P</a:t>
-            </a:r>
-            <a:r>
-              <a:rPr lang="fr-FR" dirty="0" smtClean="0"/>
-              <a:t>rogramme de contrôle moteur</a:t>
-            </a:r>
-          </a:p>
-          <a:p>
-            <a:r>
-              <a:rPr lang="fr-FR" dirty="0" smtClean="0"/>
-              <a:t>Algorithme de reconnaissance d’image : Tensorflow</a:t>
-            </a:r>
-          </a:p>
-          <a:p>
-            <a:r>
-              <a:rPr lang="fr-FR" dirty="0" smtClean="0"/>
-              <a:t>Communication UART entre raspberry Pi et microcontrôleur PIC</a:t>
-            </a:r>
-          </a:p>
-          <a:p>
-            <a:r>
-              <a:rPr lang="fr-FR" dirty="0" smtClean="0"/>
-              <a:t>Récupération du flux vidéo de la camera sur la raspberry Pi</a:t>
-            </a:r>
-          </a:p>
-          <a:p>
-            <a:endParaRPr lang="fr-FR" dirty="0" smtClean="0"/>
           </a:p>
           <a:p>
             <a:endParaRPr lang="fr-FR" dirty="0"/>
@@ -5664,10 +5456,9 @@
           <a:lstStyle/>
           <a:p>
             <a:r>
-              <a:rPr lang="fr-FR" dirty="0" smtClean="0"/>
+              <a:rPr lang="fr-FR" dirty="0"/>
               <a:t>Prise en main des outils</a:t>
             </a:r>
-            <a:endParaRPr lang="fr-FR" dirty="0"/>
           </a:p>
         </p:txBody>
       </p:sp>
@@ -5681,13 +5472,6 @@
   <p:clrMapOvr>
     <a:masterClrMapping/>
   </p:clrMapOvr>
-  <p:timing>
-    <p:tnLst>
-      <p:par>
-        <p:cTn id="1" dur="indefinite" restart="never" nodeType="tmRoot"/>
-      </p:par>
-    </p:tnLst>
-  </p:timing>
 </p:sld>
 </file>
 
@@ -5726,10 +5510,9 @@
           <a:lstStyle/>
           <a:p>
             <a:r>
-              <a:rPr lang="fr-FR" dirty="0" smtClean="0"/>
+              <a:rPr lang="fr-FR" dirty="0"/>
               <a:t>Prise en main des outils : définition du gant</a:t>
             </a:r>
-            <a:endParaRPr lang="fr-FR" dirty="0"/>
           </a:p>
         </p:txBody>
       </p:sp>
@@ -5749,10 +5532,9 @@
           <a:lstStyle/>
           <a:p>
             <a:r>
-              <a:rPr lang="fr-FR" dirty="0" smtClean="0"/>
+              <a:rPr lang="fr-FR" dirty="0"/>
               <a:t>Etape 2</a:t>
             </a:r>
-            <a:endParaRPr lang="fr-FR" dirty="0"/>
           </a:p>
         </p:txBody>
       </p:sp>
@@ -5796,13 +5578,6 @@
   <p:clrMapOvr>
     <a:masterClrMapping/>
   </p:clrMapOvr>
-  <p:timing>
-    <p:tnLst>
-      <p:par>
-        <p:cTn id="1" dur="indefinite" restart="never" nodeType="tmRoot"/>
-      </p:par>
-    </p:tnLst>
-  </p:timing>
 </p:sld>
 </file>
 
@@ -5839,29 +5614,28 @@
           <a:lstStyle/>
           <a:p>
             <a:r>
-              <a:rPr lang="fr-FR" dirty="0" smtClean="0"/>
+              <a:rPr lang="fr-FR" dirty="0"/>
               <a:t>Etape 2</a:t>
             </a:r>
+          </a:p>
+        </p:txBody>
+      </p:sp>
+      <p:sp>
+        <p:nvSpPr>
+          <p:cNvPr id="3" name="Espace réservé du contenu 2"/>
+          <p:cNvSpPr>
+            <a:spLocks noGrp="1"/>
+          </p:cNvSpPr>
+          <p:nvPr>
+            <p:ph idx="1"/>
+          </p:nvPr>
+        </p:nvSpPr>
+        <p:spPr/>
+        <p:txBody>
+          <a:bodyPr/>
+          <a:lstStyle/>
+          <a:p>
             <a:endParaRPr lang="fr-FR" dirty="0"/>
-          </a:p>
-        </p:txBody>
-      </p:sp>
-      <p:sp>
-        <p:nvSpPr>
-          <p:cNvPr id="3" name="Espace réservé du contenu 2"/>
-          <p:cNvSpPr>
-            <a:spLocks noGrp="1"/>
-          </p:cNvSpPr>
-          <p:nvPr>
-            <p:ph idx="1"/>
-          </p:nvPr>
-        </p:nvSpPr>
-        <p:spPr/>
-        <p:txBody>
-          <a:bodyPr/>
-          <a:lstStyle/>
-          <a:p>
-            <a:endParaRPr lang="fr-FR" dirty="0" smtClean="0"/>
           </a:p>
           <a:p>
             <a:endParaRPr lang="fr-FR" dirty="0"/>
@@ -5891,13 +5665,72 @@
           <a:lstStyle/>
           <a:p>
             <a:r>
-              <a:rPr lang="fr-FR" dirty="0" smtClean="0"/>
+              <a:rPr lang="fr-FR" dirty="0"/>
               <a:t>Prise en main des outils : algorithme Tensorflow</a:t>
             </a:r>
-            <a:endParaRPr lang="fr-FR" dirty="0"/>
-          </a:p>
-        </p:txBody>
-      </p:sp>
+          </a:p>
+        </p:txBody>
+      </p:sp>
+      <p:pic>
+        <p:nvPicPr>
+          <p:cNvPr id="7" name="Image 6">
+            <a:extLst>
+              <a:ext uri="{FF2B5EF4-FFF2-40B4-BE49-F238E27FC236}">
+                <a16:creationId xmlns:a16="http://schemas.microsoft.com/office/drawing/2014/main" id="{53A0A830-3511-4AF0-845D-7A69E19C3D11}"/>
+              </a:ext>
+            </a:extLst>
+          </p:cNvPr>
+          <p:cNvPicPr>
+            <a:picLocks noChangeAspect="1"/>
+          </p:cNvPicPr>
+          <p:nvPr/>
+        </p:nvPicPr>
+        <p:blipFill>
+          <a:blip r:embed="rId2"/>
+          <a:stretch>
+            <a:fillRect/>
+          </a:stretch>
+        </p:blipFill>
+        <p:spPr>
+          <a:xfrm>
+            <a:off x="946768" y="885693"/>
+            <a:ext cx="7250464" cy="1877720"/>
+          </a:xfrm>
+          <a:prstGeom prst="rect">
+            <a:avLst/>
+          </a:prstGeom>
+        </p:spPr>
+      </p:pic>
+      <p:pic>
+        <p:nvPicPr>
+          <p:cNvPr id="8" name="Image 7">
+            <a:extLst>
+              <a:ext uri="{FF2B5EF4-FFF2-40B4-BE49-F238E27FC236}">
+                <a16:creationId xmlns:a16="http://schemas.microsoft.com/office/drawing/2014/main" id="{80EE6A4A-3E8A-484D-B5F2-22A182507696}"/>
+              </a:ext>
+            </a:extLst>
+          </p:cNvPr>
+          <p:cNvPicPr>
+            <a:picLocks noChangeAspect="1"/>
+          </p:cNvPicPr>
+          <p:nvPr/>
+        </p:nvPicPr>
+        <p:blipFill>
+          <a:blip r:embed="rId3"/>
+          <a:stretch>
+            <a:fillRect/>
+          </a:stretch>
+        </p:blipFill>
+        <p:spPr>
+          <a:xfrm>
+            <a:off x="946768" y="2816851"/>
+            <a:ext cx="7250464" cy="2003629"/>
+          </a:xfrm>
+          <a:prstGeom prst="rect">
+            <a:avLst/>
+          </a:prstGeom>
+        </p:spPr>
+      </p:pic>
     </p:spTree>
     <p:extLst>
       <p:ext uri="{BB962C8B-B14F-4D97-AF65-F5344CB8AC3E}">
@@ -5908,13 +5741,6 @@
   <p:clrMapOvr>
     <a:masterClrMapping/>
   </p:clrMapOvr>
-  <p:timing>
-    <p:tnLst>
-      <p:par>
-        <p:cTn id="1" dur="indefinite" restart="never" nodeType="tmRoot"/>
-      </p:par>
-    </p:tnLst>
-  </p:timing>
 </p:sld>
 </file>
 
@@ -5951,10 +5777,9 @@
           <a:lstStyle/>
           <a:p>
             <a:r>
-              <a:rPr lang="fr-FR" dirty="0" smtClean="0"/>
+              <a:rPr lang="fr-FR" dirty="0"/>
               <a:t>Etape 2</a:t>
             </a:r>
-            <a:endParaRPr lang="fr-FR" dirty="0"/>
           </a:p>
         </p:txBody>
       </p:sp>
@@ -5974,19 +5799,19 @@
           <a:lstStyle/>
           <a:p>
             <a:r>
-              <a:rPr lang="fr-FR" dirty="0" smtClean="0"/>
+              <a:rPr lang="fr-FR" dirty="0"/>
               <a:t>Prise en main du système (navigation, fonctionnement…)</a:t>
             </a:r>
           </a:p>
           <a:p>
             <a:r>
-              <a:rPr lang="fr-FR" dirty="0" smtClean="0"/>
+              <a:rPr lang="fr-FR" dirty="0"/>
               <a:t>Mise à jour</a:t>
             </a:r>
           </a:p>
           <a:p>
             <a:r>
-              <a:rPr lang="fr-FR" dirty="0" smtClean="0"/>
+              <a:rPr lang="fr-FR" dirty="0"/>
               <a:t>Installations des divers logiciels et librairies nécessaire</a:t>
             </a:r>
           </a:p>
@@ -6018,10 +5843,9 @@
           <a:lstStyle/>
           <a:p>
             <a:r>
-              <a:rPr lang="fr-FR" dirty="0" smtClean="0"/>
+              <a:rPr lang="fr-FR" dirty="0"/>
               <a:t>Prise en main des outils : Raspberry Pi</a:t>
             </a:r>
-            <a:endParaRPr lang="fr-FR" dirty="0"/>
           </a:p>
         </p:txBody>
       </p:sp>
@@ -6035,13 +5859,6 @@
   <p:clrMapOvr>
     <a:masterClrMapping/>
   </p:clrMapOvr>
-  <p:timing>
-    <p:tnLst>
-      <p:par>
-        <p:cTn id="1" dur="indefinite" restart="never" nodeType="tmRoot"/>
-      </p:par>
-    </p:tnLst>
-  </p:timing>
 </p:sld>
 </file>
 

</xml_diff>

<commit_message>
scripts de teste de com raspi-PIC + update du diapo
</commit_message>
<xml_diff>
--- a/Trucs_utiles/Presentation/Projet SE3A.pptx
+++ b/Trucs_utiles/Presentation/Projet SE3A.pptx
@@ -5,7 +5,7 @@
     <p:sldMasterId id="2147483648" r:id="rId2"/>
   </p:sldMasterIdLst>
   <p:handoutMasterIdLst>
-    <p:handoutMasterId r:id="rId22"/>
+    <p:handoutMasterId r:id="rId21"/>
   </p:handoutMasterIdLst>
   <p:sldIdLst>
     <p:sldId id="256" r:id="rId3"/>
@@ -25,8 +25,7 @@
     <p:sldId id="283" r:id="rId17"/>
     <p:sldId id="284" r:id="rId18"/>
     <p:sldId id="282" r:id="rId19"/>
-    <p:sldId id="281" r:id="rId20"/>
-    <p:sldId id="259" r:id="rId21"/>
+    <p:sldId id="259" r:id="rId20"/>
   </p:sldIdLst>
   <p:sldSz cx="9144000" cy="5143500" type="screen16x9"/>
   <p:notesSz cx="6858000" cy="9144000"/>
@@ -4027,6 +4026,238 @@
           </a:p>
         </p:txBody>
       </p:sp>
+      <p:sp>
+        <p:nvSpPr>
+          <p:cNvPr id="5" name="Sous-titre 2">
+            <a:extLst>
+              <a:ext uri="{FF2B5EF4-FFF2-40B4-BE49-F238E27FC236}">
+                <a16:creationId xmlns:a16="http://schemas.microsoft.com/office/drawing/2014/main" id="{BF957C8B-B11A-48B9-8DAA-8C3FB0B74952}"/>
+              </a:ext>
+            </a:extLst>
+          </p:cNvPr>
+          <p:cNvSpPr txBox="1">
+            <a:spLocks/>
+          </p:cNvSpPr>
+          <p:nvPr/>
+        </p:nvSpPr>
+        <p:spPr>
+          <a:xfrm>
+            <a:off x="174430" y="1899410"/>
+            <a:ext cx="5181600" cy="1606594"/>
+          </a:xfrm>
+          <a:prstGeom prst="rect">
+            <a:avLst/>
+          </a:prstGeom>
+        </p:spPr>
+        <p:txBody>
+          <a:bodyPr wrap="square" lIns="0" tIns="0" bIns="0">
+            <a:spAutoFit/>
+          </a:bodyPr>
+          <a:lstStyle>
+            <a:lvl1pPr marL="0" indent="0" algn="l" defTabSz="457200" rtl="0" eaLnBrk="1" latinLnBrk="0" hangingPunct="1">
+              <a:spcBef>
+                <a:spcPct val="20000"/>
+              </a:spcBef>
+              <a:buFont typeface="Arial"/>
+              <a:buNone/>
+              <a:defRPr sz="2200" kern="1200">
+                <a:solidFill>
+                  <a:srgbClr val="3198E5"/>
+                </a:solidFill>
+                <a:latin typeface="Segoe UI Semilight" panose="020B0402040204020203" pitchFamily="34" charset="0"/>
+                <a:ea typeface="+mn-ea"/>
+                <a:cs typeface="Segoe UI Semilight" panose="020B0402040204020203" pitchFamily="34" charset="0"/>
+              </a:defRPr>
+            </a:lvl1pPr>
+            <a:lvl2pPr marL="457200" indent="0" algn="ctr" defTabSz="457200" rtl="0" eaLnBrk="1" latinLnBrk="0" hangingPunct="1">
+              <a:spcBef>
+                <a:spcPct val="20000"/>
+              </a:spcBef>
+              <a:buFont typeface="Arial"/>
+              <a:buNone/>
+              <a:defRPr sz="2800" kern="1200">
+                <a:solidFill>
+                  <a:schemeClr val="tx1">
+                    <a:tint val="75000"/>
+                  </a:schemeClr>
+                </a:solidFill>
+                <a:latin typeface="+mn-lt"/>
+                <a:ea typeface="+mn-ea"/>
+                <a:cs typeface="+mn-cs"/>
+              </a:defRPr>
+            </a:lvl2pPr>
+            <a:lvl3pPr marL="914400" indent="0" algn="ctr" defTabSz="457200" rtl="0" eaLnBrk="1" latinLnBrk="0" hangingPunct="1">
+              <a:spcBef>
+                <a:spcPct val="20000"/>
+              </a:spcBef>
+              <a:buFont typeface="Arial"/>
+              <a:buNone/>
+              <a:defRPr sz="2400" kern="1200">
+                <a:solidFill>
+                  <a:schemeClr val="tx1">
+                    <a:tint val="75000"/>
+                  </a:schemeClr>
+                </a:solidFill>
+                <a:latin typeface="+mn-lt"/>
+                <a:ea typeface="+mn-ea"/>
+                <a:cs typeface="+mn-cs"/>
+              </a:defRPr>
+            </a:lvl3pPr>
+            <a:lvl4pPr marL="1371600" indent="0" algn="ctr" defTabSz="457200" rtl="0" eaLnBrk="1" latinLnBrk="0" hangingPunct="1">
+              <a:spcBef>
+                <a:spcPct val="20000"/>
+              </a:spcBef>
+              <a:buFont typeface="Arial"/>
+              <a:buNone/>
+              <a:defRPr sz="2000" kern="1200">
+                <a:solidFill>
+                  <a:schemeClr val="tx1">
+                    <a:tint val="75000"/>
+                  </a:schemeClr>
+                </a:solidFill>
+                <a:latin typeface="+mn-lt"/>
+                <a:ea typeface="+mn-ea"/>
+                <a:cs typeface="+mn-cs"/>
+              </a:defRPr>
+            </a:lvl4pPr>
+            <a:lvl5pPr marL="1828800" indent="0" algn="ctr" defTabSz="457200" rtl="0" eaLnBrk="1" latinLnBrk="0" hangingPunct="1">
+              <a:spcBef>
+                <a:spcPct val="20000"/>
+              </a:spcBef>
+              <a:buFont typeface="Arial"/>
+              <a:buNone/>
+              <a:defRPr sz="2000" kern="1200">
+                <a:solidFill>
+                  <a:schemeClr val="tx1">
+                    <a:tint val="75000"/>
+                  </a:schemeClr>
+                </a:solidFill>
+                <a:latin typeface="+mn-lt"/>
+                <a:ea typeface="+mn-ea"/>
+                <a:cs typeface="+mn-cs"/>
+              </a:defRPr>
+            </a:lvl5pPr>
+            <a:lvl6pPr marL="2286000" indent="0" algn="ctr" defTabSz="457200" rtl="0" eaLnBrk="1" latinLnBrk="0" hangingPunct="1">
+              <a:spcBef>
+                <a:spcPct val="20000"/>
+              </a:spcBef>
+              <a:buFont typeface="Arial"/>
+              <a:buNone/>
+              <a:defRPr sz="2000" kern="1200">
+                <a:solidFill>
+                  <a:schemeClr val="tx1">
+                    <a:tint val="75000"/>
+                  </a:schemeClr>
+                </a:solidFill>
+                <a:latin typeface="+mn-lt"/>
+                <a:ea typeface="+mn-ea"/>
+                <a:cs typeface="+mn-cs"/>
+              </a:defRPr>
+            </a:lvl6pPr>
+            <a:lvl7pPr marL="2743200" indent="0" algn="ctr" defTabSz="457200" rtl="0" eaLnBrk="1" latinLnBrk="0" hangingPunct="1">
+              <a:spcBef>
+                <a:spcPct val="20000"/>
+              </a:spcBef>
+              <a:buFont typeface="Arial"/>
+              <a:buNone/>
+              <a:defRPr sz="2000" kern="1200">
+                <a:solidFill>
+                  <a:schemeClr val="tx1">
+                    <a:tint val="75000"/>
+                  </a:schemeClr>
+                </a:solidFill>
+                <a:latin typeface="+mn-lt"/>
+                <a:ea typeface="+mn-ea"/>
+                <a:cs typeface="+mn-cs"/>
+              </a:defRPr>
+            </a:lvl7pPr>
+            <a:lvl8pPr marL="3200400" indent="0" algn="ctr" defTabSz="457200" rtl="0" eaLnBrk="1" latinLnBrk="0" hangingPunct="1">
+              <a:spcBef>
+                <a:spcPct val="20000"/>
+              </a:spcBef>
+              <a:buFont typeface="Arial"/>
+              <a:buNone/>
+              <a:defRPr sz="2000" kern="1200">
+                <a:solidFill>
+                  <a:schemeClr val="tx1">
+                    <a:tint val="75000"/>
+                  </a:schemeClr>
+                </a:solidFill>
+                <a:latin typeface="+mn-lt"/>
+                <a:ea typeface="+mn-ea"/>
+                <a:cs typeface="+mn-cs"/>
+              </a:defRPr>
+            </a:lvl8pPr>
+            <a:lvl9pPr marL="3657600" indent="0" algn="ctr" defTabSz="457200" rtl="0" eaLnBrk="1" latinLnBrk="0" hangingPunct="1">
+              <a:spcBef>
+                <a:spcPct val="20000"/>
+              </a:spcBef>
+              <a:buFont typeface="Arial"/>
+              <a:buNone/>
+              <a:defRPr sz="2000" kern="1200">
+                <a:solidFill>
+                  <a:schemeClr val="tx1">
+                    <a:tint val="75000"/>
+                  </a:schemeClr>
+                </a:solidFill>
+                <a:latin typeface="+mn-lt"/>
+                <a:ea typeface="+mn-ea"/>
+                <a:cs typeface="+mn-cs"/>
+              </a:defRPr>
+            </a:lvl9pPr>
+          </a:lstStyle>
+          <a:p>
+            <a:r>
+              <a:rPr lang="fr-FR" sz="1800" dirty="0">
+                <a:solidFill>
+                  <a:schemeClr val="tx1"/>
+                </a:solidFill>
+              </a:rPr>
+              <a:t>Nathan Roussel</a:t>
+            </a:r>
+          </a:p>
+          <a:p>
+            <a:r>
+              <a:rPr lang="fr-FR" sz="1800" dirty="0">
+                <a:solidFill>
+                  <a:schemeClr val="tx1"/>
+                </a:solidFill>
+              </a:rPr>
+              <a:t>Amel Hamza</a:t>
+            </a:r>
+          </a:p>
+          <a:p>
+            <a:r>
+              <a:rPr lang="fr-FR" sz="1800" dirty="0">
+                <a:solidFill>
+                  <a:schemeClr val="tx1"/>
+                </a:solidFill>
+              </a:rPr>
+              <a:t>Pierre Laine</a:t>
+            </a:r>
+          </a:p>
+          <a:p>
+            <a:r>
+              <a:rPr lang="fr-FR" sz="1800" dirty="0">
+                <a:solidFill>
+                  <a:schemeClr val="tx1"/>
+                </a:solidFill>
+              </a:rPr>
+              <a:t>Jeremy Bonnet</a:t>
+            </a:r>
+          </a:p>
+          <a:p>
+            <a:r>
+              <a:rPr lang="fr-FR" sz="1800" dirty="0">
+                <a:solidFill>
+                  <a:schemeClr val="tx1"/>
+                </a:solidFill>
+              </a:rPr>
+              <a:t>Donovan Groschang</a:t>
+            </a:r>
+          </a:p>
+        </p:txBody>
+      </p:sp>
     </p:spTree>
     <p:extLst>
       <p:ext uri="{BB962C8B-B14F-4D97-AF65-F5344CB8AC3E}">
@@ -4512,16 +4743,15 @@
           <a:lstStyle/>
           <a:p>
             <a:r>
-              <a:rPr lang="fr-FR" dirty="0" smtClean="0"/>
+              <a:rPr lang="fr-FR" dirty="0"/>
               <a:t>Récupération en direct du signal vidéo</a:t>
             </a:r>
           </a:p>
           <a:p>
             <a:r>
-              <a:rPr lang="fr-FR" dirty="0" smtClean="0"/>
+              <a:rPr lang="fr-FR" dirty="0"/>
               <a:t>Sauvegarde exploitable du signal vidéo</a:t>
             </a:r>
-            <a:endParaRPr lang="fr-FR" dirty="0" smtClean="0"/>
           </a:p>
           <a:p>
             <a:pPr marL="0" indent="0">
@@ -4701,13 +4931,8 @@
           <a:p>
             <a:r>
               <a:rPr lang="fr-FR" dirty="0"/>
-              <a:t>PROBLEMES </a:t>
-            </a:r>
-            <a:r>
-              <a:rPr lang="fr-FR" dirty="0" smtClean="0"/>
-              <a:t>RENCONTRES : TECHNIQUE</a:t>
-            </a:r>
-            <a:endParaRPr lang="fr-FR" dirty="0"/>
+              <a:t>PROBLEMES RENCONTRES : TECHNIQUE</a:t>
+            </a:r>
           </a:p>
         </p:txBody>
       </p:sp>
@@ -4793,13 +5018,8 @@
           <a:p>
             <a:r>
               <a:rPr lang="fr-FR" dirty="0"/>
-              <a:t>PROBLEMES </a:t>
-            </a:r>
-            <a:r>
-              <a:rPr lang="fr-FR" dirty="0" smtClean="0"/>
-              <a:t>RENCONTRES : GESTION DE PROJET</a:t>
-            </a:r>
-            <a:endParaRPr lang="fr-FR" dirty="0"/>
+              <a:t>PROBLEMES RENCONTRES : GESTION DE PROJET</a:t>
+            </a:r>
           </a:p>
         </p:txBody>
       </p:sp>
@@ -4871,124 +5091,6 @@
 </file>
 
 <file path=ppt/slides/slide18.xml><?xml version="1.0" encoding="utf-8"?>
-<p:sld xmlns:a="http://schemas.openxmlformats.org/drawingml/2006/main" xmlns:r="http://schemas.openxmlformats.org/officeDocument/2006/relationships" xmlns:p="http://schemas.openxmlformats.org/presentationml/2006/main">
-  <p:cSld>
-    <p:spTree>
-      <p:nvGrpSpPr>
-        <p:cNvPr id="1" name=""/>
-        <p:cNvGrpSpPr/>
-        <p:nvPr/>
-      </p:nvGrpSpPr>
-      <p:grpSpPr>
-        <a:xfrm>
-          <a:off x="0" y="0"/>
-          <a:ext cx="0" cy="0"/>
-          <a:chOff x="0" y="0"/>
-          <a:chExt cx="0" cy="0"/>
-        </a:xfrm>
-      </p:grpSpPr>
-      <p:sp>
-        <p:nvSpPr>
-          <p:cNvPr id="2" name="Titre 1"/>
-          <p:cNvSpPr>
-            <a:spLocks noGrp="1"/>
-          </p:cNvSpPr>
-          <p:nvPr>
-            <p:ph type="title"/>
-          </p:nvPr>
-        </p:nvSpPr>
-        <p:spPr/>
-        <p:txBody>
-          <a:bodyPr/>
-          <a:lstStyle/>
-          <a:p>
-            <a:r>
-              <a:rPr lang="fr-FR" dirty="0"/>
-              <a:t>Etape 2</a:t>
-            </a:r>
-          </a:p>
-        </p:txBody>
-      </p:sp>
-      <p:sp>
-        <p:nvSpPr>
-          <p:cNvPr id="3" name="Espace réservé du contenu 2"/>
-          <p:cNvSpPr>
-            <a:spLocks noGrp="1"/>
-          </p:cNvSpPr>
-          <p:nvPr>
-            <p:ph idx="1"/>
-          </p:nvPr>
-        </p:nvSpPr>
-        <p:spPr/>
-        <p:txBody>
-          <a:bodyPr/>
-          <a:lstStyle/>
-          <a:p>
-            <a:r>
-              <a:rPr lang="fr-FR" dirty="0"/>
-              <a:t>Prise en main du système (navigation, fonctionnement…)</a:t>
-            </a:r>
-          </a:p>
-          <a:p>
-            <a:r>
-              <a:rPr lang="fr-FR" dirty="0"/>
-              <a:t>Mise à jour</a:t>
-            </a:r>
-          </a:p>
-          <a:p>
-            <a:r>
-              <a:rPr lang="fr-FR" dirty="0"/>
-              <a:t>Installations des divers logiciels et librairies nécessaire</a:t>
-            </a:r>
-          </a:p>
-          <a:p>
-            <a:endParaRPr lang="fr-FR" dirty="0"/>
-          </a:p>
-        </p:txBody>
-      </p:sp>
-      <p:sp>
-        <p:nvSpPr>
-          <p:cNvPr id="4" name="Espace réservé du texte 3"/>
-          <p:cNvSpPr>
-            <a:spLocks noGrp="1"/>
-          </p:cNvSpPr>
-          <p:nvPr>
-            <p:ph type="body" sz="quarter" idx="13"/>
-          </p:nvPr>
-        </p:nvSpPr>
-        <p:spPr>
-          <a:xfrm>
-            <a:off x="317421" y="358311"/>
-            <a:ext cx="6449139" cy="272821"/>
-          </a:xfrm>
-        </p:spPr>
-        <p:txBody>
-          <a:bodyPr>
-            <a:normAutofit/>
-          </a:bodyPr>
-          <a:lstStyle/>
-          <a:p>
-            <a:r>
-              <a:rPr lang="fr-FR" dirty="0"/>
-              <a:t>Prise en main des outils : Raspberry Pi</a:t>
-            </a:r>
-          </a:p>
-        </p:txBody>
-      </p:sp>
-    </p:spTree>
-    <p:extLst>
-      <p:ext uri="{BB962C8B-B14F-4D97-AF65-F5344CB8AC3E}">
-        <p14:creationId xmlns:p14="http://schemas.microsoft.com/office/powerpoint/2010/main" val="3217648815"/>
-      </p:ext>
-    </p:extLst>
-  </p:cSld>
-  <p:clrMapOvr>
-    <a:masterClrMapping/>
-  </p:clrMapOvr>
-</p:sld>
-</file>
-
-<file path=ppt/slides/slide19.xml><?xml version="1.0" encoding="utf-8"?>
 <p:sld xmlns:a="http://schemas.openxmlformats.org/drawingml/2006/main" xmlns:r="http://schemas.openxmlformats.org/officeDocument/2006/relationships" xmlns:p="http://schemas.openxmlformats.org/presentationml/2006/main">
   <p:cSld>
     <p:spTree>
@@ -5966,16 +6068,15 @@
           </p:cNvPicPr>
           <p:nvPr/>
         </p:nvPicPr>
-        <p:blipFill>
+        <p:blipFill rotWithShape="1">
           <a:blip r:embed="rId3"/>
-          <a:stretch>
-            <a:fillRect/>
-          </a:stretch>
+          <a:srcRect b="11594"/>
+          <a:stretch/>
         </p:blipFill>
         <p:spPr>
           <a:xfrm>
             <a:off x="946768" y="2816851"/>
-            <a:ext cx="7250464" cy="2003629"/>
+            <a:ext cx="7250464" cy="1771333"/>
           </a:xfrm>
           <a:prstGeom prst="rect">
             <a:avLst/>

</xml_diff>

<commit_message>
première structuration du diapo et doc github asservissement
</commit_message>
<xml_diff>
--- a/Trucs_utiles/Presentation/Projet SE3A.pptx
+++ b/Trucs_utiles/Presentation/Projet SE3A.pptx
@@ -5,27 +5,31 @@
     <p:sldMasterId id="2147483648" r:id="rId2"/>
   </p:sldMasterIdLst>
   <p:handoutMasterIdLst>
-    <p:handoutMasterId r:id="rId21"/>
+    <p:handoutMasterId r:id="rId25"/>
   </p:handoutMasterIdLst>
   <p:sldIdLst>
     <p:sldId id="256" r:id="rId3"/>
     <p:sldId id="258" r:id="rId4"/>
     <p:sldId id="267" r:id="rId5"/>
-    <p:sldId id="257" r:id="rId6"/>
-    <p:sldId id="269" r:id="rId7"/>
-    <p:sldId id="268" r:id="rId8"/>
-    <p:sldId id="263" r:id="rId9"/>
-    <p:sldId id="278" r:id="rId10"/>
-    <p:sldId id="271" r:id="rId11"/>
-    <p:sldId id="272" r:id="rId12"/>
-    <p:sldId id="262" r:id="rId13"/>
-    <p:sldId id="279" r:id="rId14"/>
-    <p:sldId id="274" r:id="rId15"/>
-    <p:sldId id="280" r:id="rId16"/>
-    <p:sldId id="283" r:id="rId17"/>
-    <p:sldId id="284" r:id="rId18"/>
-    <p:sldId id="282" r:id="rId19"/>
-    <p:sldId id="259" r:id="rId20"/>
+    <p:sldId id="269" r:id="rId6"/>
+    <p:sldId id="285" r:id="rId7"/>
+    <p:sldId id="286" r:id="rId8"/>
+    <p:sldId id="287" r:id="rId9"/>
+    <p:sldId id="288" r:id="rId10"/>
+    <p:sldId id="289" r:id="rId11"/>
+    <p:sldId id="268" r:id="rId12"/>
+    <p:sldId id="263" r:id="rId13"/>
+    <p:sldId id="278" r:id="rId14"/>
+    <p:sldId id="271" r:id="rId15"/>
+    <p:sldId id="272" r:id="rId16"/>
+    <p:sldId id="262" r:id="rId17"/>
+    <p:sldId id="279" r:id="rId18"/>
+    <p:sldId id="274" r:id="rId19"/>
+    <p:sldId id="280" r:id="rId20"/>
+    <p:sldId id="283" r:id="rId21"/>
+    <p:sldId id="284" r:id="rId22"/>
+    <p:sldId id="282" r:id="rId23"/>
+    <p:sldId id="259" r:id="rId24"/>
   </p:sldIdLst>
   <p:sldSz cx="9144000" cy="5143500" type="screen16x9"/>
   <p:notesSz cx="6858000" cy="9144000"/>
@@ -232,7 +236,7 @@
           </a:lstStyle>
           <a:p>
             <a:fld id="{4B230A23-3E98-F64D-859B-DE462771A158}" type="datetimeFigureOut">
-              <a:t>14/05/2019</a:t>
+              <a:t>23/05/2019</a:t>
             </a:fld>
             <a:endParaRPr lang="fr-FR"/>
           </a:p>
@@ -545,7 +549,7 @@
             <a:fld id="{5BBF241E-D95D-F947-BD40-BA0B1092A59D}" type="datetimeFigureOut">
               <a:rPr lang="fr-FR" smtClean="0"/>
               <a:pPr/>
-              <a:t>14/05/2019</a:t>
+              <a:t>23/05/2019</a:t>
             </a:fld>
             <a:endParaRPr lang="fr-FR"/>
           </a:p>
@@ -817,7 +821,7 @@
             <a:fld id="{5BBF241E-D95D-F947-BD40-BA0B1092A59D}" type="datetimeFigureOut">
               <a:rPr lang="fr-FR" smtClean="0"/>
               <a:pPr/>
-              <a:t>14/05/2019</a:t>
+              <a:t>23/05/2019</a:t>
             </a:fld>
             <a:endParaRPr lang="fr-FR"/>
           </a:p>
@@ -1090,7 +1094,7 @@
             <a:fld id="{5BBF241E-D95D-F947-BD40-BA0B1092A59D}" type="datetimeFigureOut">
               <a:rPr lang="fr-FR" smtClean="0"/>
               <a:pPr/>
-              <a:t>14/05/2019</a:t>
+              <a:t>23/05/2019</a:t>
             </a:fld>
             <a:endParaRPr lang="fr-FR"/>
           </a:p>
@@ -1320,7 +1324,7 @@
             <a:fld id="{5BBF241E-D95D-F947-BD40-BA0B1092A59D}" type="datetimeFigureOut">
               <a:rPr lang="fr-FR" smtClean="0"/>
               <a:pPr/>
-              <a:t>14/05/2019</a:t>
+              <a:t>23/05/2019</a:t>
             </a:fld>
             <a:endParaRPr lang="fr-FR"/>
           </a:p>
@@ -1695,7 +1699,7 @@
             <a:fld id="{5BBF241E-D95D-F947-BD40-BA0B1092A59D}" type="datetimeFigureOut">
               <a:rPr lang="fr-FR" smtClean="0"/>
               <a:pPr/>
-              <a:t>14/05/2019</a:t>
+              <a:t>23/05/2019</a:t>
             </a:fld>
             <a:endParaRPr lang="fr-FR"/>
           </a:p>
@@ -2039,7 +2043,7 @@
             <a:fld id="{5BBF241E-D95D-F947-BD40-BA0B1092A59D}" type="datetimeFigureOut">
               <a:rPr lang="fr-FR" smtClean="0"/>
               <a:pPr/>
-              <a:t>14/05/2019</a:t>
+              <a:t>23/05/2019</a:t>
             </a:fld>
             <a:endParaRPr lang="fr-FR"/>
           </a:p>
@@ -2558,7 +2562,7 @@
             <a:fld id="{5BBF241E-D95D-F947-BD40-BA0B1092A59D}" type="datetimeFigureOut">
               <a:rPr lang="fr-FR" smtClean="0"/>
               <a:pPr/>
-              <a:t>14/05/2019</a:t>
+              <a:t>23/05/2019</a:t>
             </a:fld>
             <a:endParaRPr lang="fr-FR"/>
           </a:p>
@@ -2833,7 +2837,7 @@
             <a:fld id="{5BBF241E-D95D-F947-BD40-BA0B1092A59D}" type="datetimeFigureOut">
               <a:rPr lang="fr-FR" smtClean="0"/>
               <a:pPr/>
-              <a:t>14/05/2019</a:t>
+              <a:t>23/05/2019</a:t>
             </a:fld>
             <a:endParaRPr lang="fr-FR"/>
           </a:p>
@@ -3074,7 +3078,7 @@
             <a:fld id="{5BBF241E-D95D-F947-BD40-BA0B1092A59D}" type="datetimeFigureOut">
               <a:rPr lang="fr-FR" smtClean="0"/>
               <a:pPr/>
-              <a:t>14/05/2019</a:t>
+              <a:t>23/05/2019</a:t>
             </a:fld>
             <a:endParaRPr lang="fr-FR"/>
           </a:p>
@@ -3256,7 +3260,7 @@
             <a:fld id="{5BBF241E-D95D-F947-BD40-BA0B1092A59D}" type="datetimeFigureOut">
               <a:rPr lang="fr-FR" smtClean="0"/>
               <a:pPr/>
-              <a:t>14/05/2019</a:t>
+              <a:t>23/05/2019</a:t>
             </a:fld>
             <a:endParaRPr lang="fr-FR"/>
           </a:p>
@@ -3603,7 +3607,7 @@
             <a:fld id="{5BBF241E-D95D-F947-BD40-BA0B1092A59D}" type="datetimeFigureOut">
               <a:rPr lang="fr-FR" smtClean="0"/>
               <a:pPr/>
-              <a:t>14/05/2019</a:t>
+              <a:t>23/05/2019</a:t>
             </a:fld>
             <a:endParaRPr lang="fr-FR"/>
           </a:p>
@@ -4014,15 +4018,29 @@
             <p:ph type="subTitle" idx="1"/>
           </p:nvPr>
         </p:nvSpPr>
-        <p:spPr/>
+        <p:spPr>
+          <a:xfrm>
+            <a:off x="1181101" y="1149768"/>
+            <a:ext cx="5181600" cy="677108"/>
+          </a:xfrm>
+        </p:spPr>
         <p:txBody>
           <a:bodyPr/>
           <a:lstStyle/>
           <a:p>
             <a:r>
-              <a:rPr lang="fr-FR" dirty="0"/>
-              <a:t>Amélioration du Robot MT</a:t>
-            </a:r>
+              <a:rPr lang="fr-FR" dirty="0" smtClean="0"/>
+              <a:t>Implémentation </a:t>
+            </a:r>
+            <a:r>
+              <a:rPr lang="fr-FR" dirty="0"/>
+              <a:t>de reconnaissance d'image au </a:t>
+            </a:r>
+            <a:r>
+              <a:rPr lang="fr-FR" dirty="0" err="1"/>
+              <a:t>RobotMT</a:t>
+            </a:r>
+            <a:endParaRPr lang="fr-FR" dirty="0"/>
           </a:p>
         </p:txBody>
       </p:sp>
@@ -4042,7 +4060,7 @@
         </p:nvSpPr>
         <p:spPr>
           <a:xfrm>
-            <a:off x="174430" y="1899410"/>
+            <a:off x="174430" y="2076831"/>
             <a:ext cx="5181600" cy="1606594"/>
           </a:xfrm>
           <a:prstGeom prst="rect">
@@ -4327,1326 +4345,6 @@
           <a:p>
             <a:r>
               <a:rPr lang="fr-FR" dirty="0"/>
-              <a:t>Prise en main du système (navigation, fonctionnement…)</a:t>
-            </a:r>
-          </a:p>
-          <a:p>
-            <a:r>
-              <a:rPr lang="fr-FR" dirty="0"/>
-              <a:t>Mise à jour</a:t>
-            </a:r>
-          </a:p>
-          <a:p>
-            <a:r>
-              <a:rPr lang="fr-FR" dirty="0"/>
-              <a:t>Installations des divers logiciels et librairies nécessaire</a:t>
-            </a:r>
-          </a:p>
-          <a:p>
-            <a:endParaRPr lang="fr-FR" dirty="0"/>
-          </a:p>
-        </p:txBody>
-      </p:sp>
-      <p:sp>
-        <p:nvSpPr>
-          <p:cNvPr id="4" name="Espace réservé du texte 3"/>
-          <p:cNvSpPr>
-            <a:spLocks noGrp="1"/>
-          </p:cNvSpPr>
-          <p:nvPr>
-            <p:ph type="body" sz="quarter" idx="13"/>
-          </p:nvPr>
-        </p:nvSpPr>
-        <p:spPr>
-          <a:xfrm>
-            <a:off x="317421" y="358311"/>
-            <a:ext cx="6449139" cy="272821"/>
-          </a:xfrm>
-        </p:spPr>
-        <p:txBody>
-          <a:bodyPr>
-            <a:normAutofit/>
-          </a:bodyPr>
-          <a:lstStyle/>
-          <a:p>
-            <a:r>
-              <a:rPr lang="fr-FR" dirty="0"/>
-              <a:t>Prise en main des outils : Raspberry Pi</a:t>
-            </a:r>
-          </a:p>
-        </p:txBody>
-      </p:sp>
-    </p:spTree>
-    <p:extLst>
-      <p:ext uri="{BB962C8B-B14F-4D97-AF65-F5344CB8AC3E}">
-        <p14:creationId xmlns:p14="http://schemas.microsoft.com/office/powerpoint/2010/main" val="3662863792"/>
-      </p:ext>
-    </p:extLst>
-  </p:cSld>
-  <p:clrMapOvr>
-    <a:masterClrMapping/>
-  </p:clrMapOvr>
-</p:sld>
-</file>
-
-<file path=ppt/slides/slide11.xml><?xml version="1.0" encoding="utf-8"?>
-<p:sld xmlns:a="http://schemas.openxmlformats.org/drawingml/2006/main" xmlns:r="http://schemas.openxmlformats.org/officeDocument/2006/relationships" xmlns:p="http://schemas.openxmlformats.org/presentationml/2006/main">
-  <p:cSld>
-    <p:spTree>
-      <p:nvGrpSpPr>
-        <p:cNvPr id="1" name=""/>
-        <p:cNvGrpSpPr/>
-        <p:nvPr/>
-      </p:nvGrpSpPr>
-      <p:grpSpPr>
-        <a:xfrm>
-          <a:off x="0" y="0"/>
-          <a:ext cx="0" cy="0"/>
-          <a:chOff x="0" y="0"/>
-          <a:chExt cx="0" cy="0"/>
-        </a:xfrm>
-      </p:grpSpPr>
-      <p:sp>
-        <p:nvSpPr>
-          <p:cNvPr id="2" name="Titre 1"/>
-          <p:cNvSpPr>
-            <a:spLocks noGrp="1"/>
-          </p:cNvSpPr>
-          <p:nvPr>
-            <p:ph type="title"/>
-          </p:nvPr>
-        </p:nvSpPr>
-        <p:spPr/>
-        <p:txBody>
-          <a:bodyPr/>
-          <a:lstStyle/>
-          <a:p>
-            <a:r>
-              <a:rPr lang="fr-FR" dirty="0"/>
-              <a:t>Etape 2</a:t>
-            </a:r>
-          </a:p>
-        </p:txBody>
-      </p:sp>
-      <p:sp>
-        <p:nvSpPr>
-          <p:cNvPr id="5" name="Espace réservé du texte 4"/>
-          <p:cNvSpPr>
-            <a:spLocks noGrp="1"/>
-          </p:cNvSpPr>
-          <p:nvPr>
-            <p:ph type="body" sz="quarter" idx="14"/>
-          </p:nvPr>
-        </p:nvSpPr>
-        <p:spPr>
-          <a:xfrm>
-            <a:off x="317421" y="358311"/>
-            <a:ext cx="4966555" cy="272821"/>
-          </a:xfrm>
-        </p:spPr>
-        <p:txBody>
-          <a:bodyPr>
-            <a:normAutofit fontScale="85000" lnSpcReduction="10000"/>
-          </a:bodyPr>
-          <a:lstStyle/>
-          <a:p>
-            <a:r>
-              <a:rPr lang="fr-FR" dirty="0"/>
-              <a:t>Prise en main des outils : communication UART </a:t>
-            </a:r>
-            <a:r>
-              <a:rPr lang="fr-FR" dirty="0" err="1"/>
-              <a:t>Rasp-Rasp</a:t>
-            </a:r>
-            <a:endParaRPr lang="fr-FR" dirty="0"/>
-          </a:p>
-        </p:txBody>
-      </p:sp>
-      <p:pic>
-        <p:nvPicPr>
-          <p:cNvPr id="11" name="Espace réservé du contenu 4"/>
-          <p:cNvPicPr>
-            <a:picLocks noGrp="1" noChangeAspect="1"/>
-          </p:cNvPicPr>
-          <p:nvPr>
-            <p:ph type="chart" sz="quarter" idx="15"/>
-          </p:nvPr>
-        </p:nvPicPr>
-        <p:blipFill>
-          <a:blip r:embed="rId2">
-            <a:extLst>
-              <a:ext uri="{28A0092B-C50C-407E-A947-70E740481C1C}">
-                <a14:useLocalDpi xmlns:a14="http://schemas.microsoft.com/office/drawing/2010/main" val="0"/>
-              </a:ext>
-            </a:extLst>
-          </a:blip>
-          <a:stretch>
-            <a:fillRect/>
-          </a:stretch>
-        </p:blipFill>
-        <p:spPr>
-          <a:xfrm>
-            <a:off x="2102077" y="1467196"/>
-            <a:ext cx="4207270" cy="2637761"/>
-          </a:xfrm>
-        </p:spPr>
-      </p:pic>
-    </p:spTree>
-    <p:extLst>
-      <p:ext uri="{BB962C8B-B14F-4D97-AF65-F5344CB8AC3E}">
-        <p14:creationId xmlns:p14="http://schemas.microsoft.com/office/powerpoint/2010/main" val="254268587"/>
-      </p:ext>
-    </p:extLst>
-  </p:cSld>
-  <p:clrMapOvr>
-    <a:masterClrMapping/>
-  </p:clrMapOvr>
-</p:sld>
-</file>
-
-<file path=ppt/slides/slide12.xml><?xml version="1.0" encoding="utf-8"?>
-<p:sld xmlns:a="http://schemas.openxmlformats.org/drawingml/2006/main" xmlns:r="http://schemas.openxmlformats.org/officeDocument/2006/relationships" xmlns:p="http://schemas.openxmlformats.org/presentationml/2006/main">
-  <p:cSld>
-    <p:spTree>
-      <p:nvGrpSpPr>
-        <p:cNvPr id="1" name=""/>
-        <p:cNvGrpSpPr/>
-        <p:nvPr/>
-      </p:nvGrpSpPr>
-      <p:grpSpPr>
-        <a:xfrm>
-          <a:off x="0" y="0"/>
-          <a:ext cx="0" cy="0"/>
-          <a:chOff x="0" y="0"/>
-          <a:chExt cx="0" cy="0"/>
-        </a:xfrm>
-      </p:grpSpPr>
-      <p:sp>
-        <p:nvSpPr>
-          <p:cNvPr id="2" name="Titre 1"/>
-          <p:cNvSpPr>
-            <a:spLocks noGrp="1"/>
-          </p:cNvSpPr>
-          <p:nvPr>
-            <p:ph type="title"/>
-          </p:nvPr>
-        </p:nvSpPr>
-        <p:spPr/>
-        <p:txBody>
-          <a:bodyPr/>
-          <a:lstStyle/>
-          <a:p>
-            <a:r>
-              <a:rPr lang="fr-FR" dirty="0"/>
-              <a:t>Etape 2</a:t>
-            </a:r>
-          </a:p>
-        </p:txBody>
-      </p:sp>
-      <p:sp>
-        <p:nvSpPr>
-          <p:cNvPr id="4" name="Espace réservé du texte 3"/>
-          <p:cNvSpPr>
-            <a:spLocks noGrp="1"/>
-          </p:cNvSpPr>
-          <p:nvPr>
-            <p:ph type="body" sz="quarter" idx="3"/>
-          </p:nvPr>
-        </p:nvSpPr>
-        <p:spPr>
-          <a:xfrm>
-            <a:off x="4346598" y="1478691"/>
-            <a:ext cx="4254668" cy="2820340"/>
-          </a:xfrm>
-        </p:spPr>
-        <p:txBody>
-          <a:bodyPr/>
-          <a:lstStyle/>
-          <a:p>
-            <a:r>
-              <a:rPr lang="fr-FR" dirty="0"/>
-              <a:t>Envoie de commande depuis le PC</a:t>
-            </a:r>
-          </a:p>
-          <a:p>
-            <a:r>
-              <a:rPr lang="fr-FR" dirty="0"/>
-              <a:t>Réception des commandes sur le PIC</a:t>
-            </a:r>
-          </a:p>
-          <a:p>
-            <a:r>
-              <a:rPr lang="fr-FR" dirty="0"/>
-              <a:t>Réponse du PIC vers le PC</a:t>
-            </a:r>
-          </a:p>
-        </p:txBody>
-      </p:sp>
-      <p:sp>
-        <p:nvSpPr>
-          <p:cNvPr id="5" name="Espace réservé du texte 4"/>
-          <p:cNvSpPr>
-            <a:spLocks noGrp="1"/>
-          </p:cNvSpPr>
-          <p:nvPr>
-            <p:ph type="body" sz="quarter" idx="14"/>
-          </p:nvPr>
-        </p:nvSpPr>
-        <p:spPr>
-          <a:xfrm>
-            <a:off x="317421" y="358311"/>
-            <a:ext cx="4966555" cy="272821"/>
-          </a:xfrm>
-        </p:spPr>
-        <p:txBody>
-          <a:bodyPr>
-            <a:normAutofit fontScale="92500"/>
-          </a:bodyPr>
-          <a:lstStyle/>
-          <a:p>
-            <a:r>
-              <a:rPr lang="fr-FR" dirty="0"/>
-              <a:t>Prise en main des outils : communication UART PC-PIC</a:t>
-            </a:r>
-          </a:p>
-        </p:txBody>
-      </p:sp>
-      <p:pic>
-        <p:nvPicPr>
-          <p:cNvPr id="17" name="Image 16" descr="Une image contenant capture d’écran&#10;&#10;Description générée automatiquement">
-            <a:extLst>
-              <a:ext uri="{FF2B5EF4-FFF2-40B4-BE49-F238E27FC236}">
-                <a16:creationId xmlns:a16="http://schemas.microsoft.com/office/drawing/2014/main" id="{DC69F3F3-CDB0-4BD8-BE00-78FD8A584B66}"/>
-              </a:ext>
-            </a:extLst>
-          </p:cNvPr>
-          <p:cNvPicPr>
-            <a:picLocks noChangeAspect="1"/>
-          </p:cNvPicPr>
-          <p:nvPr/>
-        </p:nvPicPr>
-        <p:blipFill>
-          <a:blip r:embed="rId2"/>
-          <a:stretch>
-            <a:fillRect/>
-          </a:stretch>
-        </p:blipFill>
-        <p:spPr>
-          <a:xfrm>
-            <a:off x="542734" y="1478691"/>
-            <a:ext cx="3634056" cy="2689655"/>
-          </a:xfrm>
-          <a:prstGeom prst="rect">
-            <a:avLst/>
-          </a:prstGeom>
-          <a:ln w="57150">
-            <a:solidFill>
-              <a:srgbClr val="3198E5"/>
-            </a:solidFill>
-          </a:ln>
-        </p:spPr>
-      </p:pic>
-    </p:spTree>
-    <p:extLst>
-      <p:ext uri="{BB962C8B-B14F-4D97-AF65-F5344CB8AC3E}">
-        <p14:creationId xmlns:p14="http://schemas.microsoft.com/office/powerpoint/2010/main" val="2436744945"/>
-      </p:ext>
-    </p:extLst>
-  </p:cSld>
-  <p:clrMapOvr>
-    <a:masterClrMapping/>
-  </p:clrMapOvr>
-</p:sld>
-</file>
-
-<file path=ppt/slides/slide13.xml><?xml version="1.0" encoding="utf-8"?>
-<p:sld xmlns:a="http://schemas.openxmlformats.org/drawingml/2006/main" xmlns:r="http://schemas.openxmlformats.org/officeDocument/2006/relationships" xmlns:p="http://schemas.openxmlformats.org/presentationml/2006/main">
-  <p:cSld>
-    <p:spTree>
-      <p:nvGrpSpPr>
-        <p:cNvPr id="1" name=""/>
-        <p:cNvGrpSpPr/>
-        <p:nvPr/>
-      </p:nvGrpSpPr>
-      <p:grpSpPr>
-        <a:xfrm>
-          <a:off x="0" y="0"/>
-          <a:ext cx="0" cy="0"/>
-          <a:chOff x="0" y="0"/>
-          <a:chExt cx="0" cy="0"/>
-        </a:xfrm>
-      </p:grpSpPr>
-      <p:sp>
-        <p:nvSpPr>
-          <p:cNvPr id="2" name="Titre 1"/>
-          <p:cNvSpPr>
-            <a:spLocks noGrp="1"/>
-          </p:cNvSpPr>
-          <p:nvPr>
-            <p:ph type="title"/>
-          </p:nvPr>
-        </p:nvSpPr>
-        <p:spPr/>
-        <p:txBody>
-          <a:bodyPr/>
-          <a:lstStyle/>
-          <a:p>
-            <a:r>
-              <a:rPr lang="fr-FR" dirty="0"/>
-              <a:t>Etape 2</a:t>
-            </a:r>
-          </a:p>
-        </p:txBody>
-      </p:sp>
-      <p:sp>
-        <p:nvSpPr>
-          <p:cNvPr id="4" name="Espace réservé du texte 3"/>
-          <p:cNvSpPr>
-            <a:spLocks noGrp="1"/>
-          </p:cNvSpPr>
-          <p:nvPr>
-            <p:ph type="body" sz="quarter" idx="13"/>
-          </p:nvPr>
-        </p:nvSpPr>
-        <p:spPr>
-          <a:xfrm>
-            <a:off x="317421" y="358311"/>
-            <a:ext cx="6449139" cy="272821"/>
-          </a:xfrm>
-        </p:spPr>
-        <p:txBody>
-          <a:bodyPr>
-            <a:normAutofit/>
-          </a:bodyPr>
-          <a:lstStyle/>
-          <a:p>
-            <a:r>
-              <a:rPr lang="fr-FR" dirty="0"/>
-              <a:t>Prise en main des outils : Flux vidéo</a:t>
-            </a:r>
-          </a:p>
-        </p:txBody>
-      </p:sp>
-      <p:sp>
-        <p:nvSpPr>
-          <p:cNvPr id="3" name="Espace réservé du contenu 2"/>
-          <p:cNvSpPr>
-            <a:spLocks noGrp="1"/>
-          </p:cNvSpPr>
-          <p:nvPr>
-            <p:ph idx="1"/>
-          </p:nvPr>
-        </p:nvSpPr>
-        <p:spPr/>
-        <p:txBody>
-          <a:bodyPr/>
-          <a:lstStyle/>
-          <a:p>
-            <a:r>
-              <a:rPr lang="fr-FR" dirty="0"/>
-              <a:t>Récupération en direct du signal vidéo</a:t>
-            </a:r>
-          </a:p>
-          <a:p>
-            <a:r>
-              <a:rPr lang="fr-FR" dirty="0"/>
-              <a:t>Sauvegarde exploitable du signal vidéo</a:t>
-            </a:r>
-          </a:p>
-          <a:p>
-            <a:pPr marL="0" indent="0">
-              <a:buNone/>
-            </a:pPr>
-            <a:endParaRPr lang="fr-FR" dirty="0"/>
-          </a:p>
-        </p:txBody>
-      </p:sp>
-    </p:spTree>
-    <p:extLst>
-      <p:ext uri="{BB962C8B-B14F-4D97-AF65-F5344CB8AC3E}">
-        <p14:creationId xmlns:p14="http://schemas.microsoft.com/office/powerpoint/2010/main" val="4231106049"/>
-      </p:ext>
-    </p:extLst>
-  </p:cSld>
-  <p:clrMapOvr>
-    <a:masterClrMapping/>
-  </p:clrMapOvr>
-</p:sld>
-</file>
-
-<file path=ppt/slides/slide14.xml><?xml version="1.0" encoding="utf-8"?>
-<p:sld xmlns:a="http://schemas.openxmlformats.org/drawingml/2006/main" xmlns:r="http://schemas.openxmlformats.org/officeDocument/2006/relationships" xmlns:p="http://schemas.openxmlformats.org/presentationml/2006/main">
-  <p:cSld>
-    <p:spTree>
-      <p:nvGrpSpPr>
-        <p:cNvPr id="1" name=""/>
-        <p:cNvGrpSpPr/>
-        <p:nvPr/>
-      </p:nvGrpSpPr>
-      <p:grpSpPr>
-        <a:xfrm>
-          <a:off x="0" y="0"/>
-          <a:ext cx="0" cy="0"/>
-          <a:chOff x="0" y="0"/>
-          <a:chExt cx="0" cy="0"/>
-        </a:xfrm>
-      </p:grpSpPr>
-      <p:sp>
-        <p:nvSpPr>
-          <p:cNvPr id="2" name="Titre 1"/>
-          <p:cNvSpPr>
-            <a:spLocks noGrp="1"/>
-          </p:cNvSpPr>
-          <p:nvPr>
-            <p:ph type="title"/>
-          </p:nvPr>
-        </p:nvSpPr>
-        <p:spPr>
-          <a:xfrm>
-            <a:off x="3780753" y="1488323"/>
-            <a:ext cx="4280049" cy="1291587"/>
-          </a:xfrm>
-        </p:spPr>
-        <p:txBody>
-          <a:bodyPr>
-            <a:normAutofit/>
-          </a:bodyPr>
-          <a:lstStyle/>
-          <a:p>
-            <a:r>
-              <a:rPr lang="fr-FR" dirty="0"/>
-              <a:t>Problèmes rencontrés</a:t>
-            </a:r>
-          </a:p>
-        </p:txBody>
-      </p:sp>
-    </p:spTree>
-    <p:extLst>
-      <p:ext uri="{BB962C8B-B14F-4D97-AF65-F5344CB8AC3E}">
-        <p14:creationId xmlns:p14="http://schemas.microsoft.com/office/powerpoint/2010/main" val="1436300240"/>
-      </p:ext>
-    </p:extLst>
-  </p:cSld>
-  <p:clrMapOvr>
-    <a:masterClrMapping/>
-  </p:clrMapOvr>
-</p:sld>
-</file>
-
-<file path=ppt/slides/slide15.xml><?xml version="1.0" encoding="utf-8"?>
-<p:sld xmlns:a="http://schemas.openxmlformats.org/drawingml/2006/main" xmlns:r="http://schemas.openxmlformats.org/officeDocument/2006/relationships" xmlns:p="http://schemas.openxmlformats.org/presentationml/2006/main">
-  <p:cSld>
-    <p:spTree>
-      <p:nvGrpSpPr>
-        <p:cNvPr id="1" name=""/>
-        <p:cNvGrpSpPr/>
-        <p:nvPr/>
-      </p:nvGrpSpPr>
-      <p:grpSpPr>
-        <a:xfrm>
-          <a:off x="0" y="0"/>
-          <a:ext cx="0" cy="0"/>
-          <a:chOff x="0" y="0"/>
-          <a:chExt cx="0" cy="0"/>
-        </a:xfrm>
-      </p:grpSpPr>
-      <p:sp>
-        <p:nvSpPr>
-          <p:cNvPr id="3" name="Espace réservé du contenu 2"/>
-          <p:cNvSpPr>
-            <a:spLocks noGrp="1"/>
-          </p:cNvSpPr>
-          <p:nvPr>
-            <p:ph idx="1"/>
-          </p:nvPr>
-        </p:nvSpPr>
-        <p:spPr/>
-        <p:txBody>
-          <a:bodyPr/>
-          <a:lstStyle/>
-          <a:p>
-            <a:r>
-              <a:rPr lang="fr-FR" dirty="0"/>
-              <a:t>Compréhension du firmware</a:t>
-            </a:r>
-          </a:p>
-          <a:p>
-            <a:r>
-              <a:rPr lang="fr-FR" dirty="0"/>
-              <a:t>Communication UART PC-PIC</a:t>
-            </a:r>
-          </a:p>
-          <a:p>
-            <a:r>
-              <a:rPr lang="fr-FR" dirty="0"/>
-              <a:t>Communication UART </a:t>
-            </a:r>
-            <a:r>
-              <a:rPr lang="fr-FR" dirty="0" err="1"/>
-              <a:t>Rasp-Rasp</a:t>
-            </a:r>
-            <a:endParaRPr lang="fr-FR" dirty="0"/>
-          </a:p>
-          <a:p>
-            <a:r>
-              <a:rPr lang="fr-FR" dirty="0"/>
-              <a:t>Compatibilité de version entre différents logiciels sur la Raspberry</a:t>
-            </a:r>
-          </a:p>
-          <a:p>
-            <a:r>
-              <a:rPr lang="fr-FR" dirty="0"/>
-              <a:t>Problème de boot Raspberry</a:t>
-            </a:r>
-          </a:p>
-          <a:p>
-            <a:r>
-              <a:rPr lang="fr-FR" dirty="0"/>
-              <a:t>Problème de mémoire SD Raspberry</a:t>
-            </a:r>
-          </a:p>
-        </p:txBody>
-      </p:sp>
-      <p:sp>
-        <p:nvSpPr>
-          <p:cNvPr id="4" name="Espace réservé du texte 3"/>
-          <p:cNvSpPr>
-            <a:spLocks noGrp="1"/>
-          </p:cNvSpPr>
-          <p:nvPr>
-            <p:ph type="body" sz="quarter" idx="13"/>
-          </p:nvPr>
-        </p:nvSpPr>
-        <p:spPr>
-          <a:xfrm>
-            <a:off x="317421" y="358311"/>
-            <a:ext cx="6449139" cy="272821"/>
-          </a:xfrm>
-        </p:spPr>
-        <p:txBody>
-          <a:bodyPr>
-            <a:normAutofit/>
-          </a:bodyPr>
-          <a:lstStyle/>
-          <a:p>
-            <a:r>
-              <a:rPr lang="fr-FR" dirty="0"/>
-              <a:t>PROBLEMES RENCONTRES : TECHNIQUE</a:t>
-            </a:r>
-          </a:p>
-        </p:txBody>
-      </p:sp>
-    </p:spTree>
-    <p:extLst>
-      <p:ext uri="{BB962C8B-B14F-4D97-AF65-F5344CB8AC3E}">
-        <p14:creationId xmlns:p14="http://schemas.microsoft.com/office/powerpoint/2010/main" val="1085629461"/>
-      </p:ext>
-    </p:extLst>
-  </p:cSld>
-  <p:clrMapOvr>
-    <a:masterClrMapping/>
-  </p:clrMapOvr>
-</p:sld>
-</file>
-
-<file path=ppt/slides/slide16.xml><?xml version="1.0" encoding="utf-8"?>
-<p:sld xmlns:a="http://schemas.openxmlformats.org/drawingml/2006/main" xmlns:r="http://schemas.openxmlformats.org/officeDocument/2006/relationships" xmlns:p="http://schemas.openxmlformats.org/presentationml/2006/main">
-  <p:cSld>
-    <p:spTree>
-      <p:nvGrpSpPr>
-        <p:cNvPr id="1" name=""/>
-        <p:cNvGrpSpPr/>
-        <p:nvPr/>
-      </p:nvGrpSpPr>
-      <p:grpSpPr>
-        <a:xfrm>
-          <a:off x="0" y="0"/>
-          <a:ext cx="0" cy="0"/>
-          <a:chOff x="0" y="0"/>
-          <a:chExt cx="0" cy="0"/>
-        </a:xfrm>
-      </p:grpSpPr>
-      <p:sp>
-        <p:nvSpPr>
-          <p:cNvPr id="3" name="Espace réservé du contenu 2"/>
-          <p:cNvSpPr>
-            <a:spLocks noGrp="1"/>
-          </p:cNvSpPr>
-          <p:nvPr>
-            <p:ph idx="1"/>
-          </p:nvPr>
-        </p:nvSpPr>
-        <p:spPr/>
-        <p:txBody>
-          <a:bodyPr/>
-          <a:lstStyle/>
-          <a:p>
-            <a:r>
-              <a:rPr lang="fr-FR" dirty="0"/>
-              <a:t>Gestion du temps</a:t>
-            </a:r>
-          </a:p>
-          <a:p>
-            <a:r>
-              <a:rPr lang="fr-FR" dirty="0"/>
-              <a:t>Gestion des objectifs</a:t>
-            </a:r>
-          </a:p>
-        </p:txBody>
-      </p:sp>
-      <p:sp>
-        <p:nvSpPr>
-          <p:cNvPr id="4" name="Espace réservé du texte 3"/>
-          <p:cNvSpPr>
-            <a:spLocks noGrp="1"/>
-          </p:cNvSpPr>
-          <p:nvPr>
-            <p:ph type="body" sz="quarter" idx="13"/>
-          </p:nvPr>
-        </p:nvSpPr>
-        <p:spPr>
-          <a:xfrm>
-            <a:off x="317421" y="358311"/>
-            <a:ext cx="6449139" cy="272821"/>
-          </a:xfrm>
-        </p:spPr>
-        <p:txBody>
-          <a:bodyPr>
-            <a:normAutofit/>
-          </a:bodyPr>
-          <a:lstStyle/>
-          <a:p>
-            <a:r>
-              <a:rPr lang="fr-FR" dirty="0"/>
-              <a:t>PROBLEMES RENCONTRES : GESTION DE PROJET</a:t>
-            </a:r>
-          </a:p>
-        </p:txBody>
-      </p:sp>
-    </p:spTree>
-    <p:extLst>
-      <p:ext uri="{BB962C8B-B14F-4D97-AF65-F5344CB8AC3E}">
-        <p14:creationId xmlns:p14="http://schemas.microsoft.com/office/powerpoint/2010/main" val="616241262"/>
-      </p:ext>
-    </p:extLst>
-  </p:cSld>
-  <p:clrMapOvr>
-    <a:masterClrMapping/>
-  </p:clrMapOvr>
-</p:sld>
-</file>
-
-<file path=ppt/slides/slide17.xml><?xml version="1.0" encoding="utf-8"?>
-<p:sld xmlns:a="http://schemas.openxmlformats.org/drawingml/2006/main" xmlns:r="http://schemas.openxmlformats.org/officeDocument/2006/relationships" xmlns:p="http://schemas.openxmlformats.org/presentationml/2006/main">
-  <p:cSld>
-    <p:spTree>
-      <p:nvGrpSpPr>
-        <p:cNvPr id="1" name=""/>
-        <p:cNvGrpSpPr/>
-        <p:nvPr/>
-      </p:nvGrpSpPr>
-      <p:grpSpPr>
-        <a:xfrm>
-          <a:off x="0" y="0"/>
-          <a:ext cx="0" cy="0"/>
-          <a:chOff x="0" y="0"/>
-          <a:chExt cx="0" cy="0"/>
-        </a:xfrm>
-      </p:grpSpPr>
-      <p:sp>
-        <p:nvSpPr>
-          <p:cNvPr id="2" name="Titre 1"/>
-          <p:cNvSpPr>
-            <a:spLocks noGrp="1"/>
-          </p:cNvSpPr>
-          <p:nvPr>
-            <p:ph type="title"/>
-          </p:nvPr>
-        </p:nvSpPr>
-        <p:spPr/>
-        <p:txBody>
-          <a:bodyPr>
-            <a:normAutofit/>
-          </a:bodyPr>
-          <a:lstStyle/>
-          <a:p>
-            <a:r>
-              <a:rPr lang="fr-FR" dirty="0"/>
-              <a:t>Reste à faire</a:t>
-            </a:r>
-          </a:p>
-        </p:txBody>
-      </p:sp>
-    </p:spTree>
-    <p:extLst>
-      <p:ext uri="{BB962C8B-B14F-4D97-AF65-F5344CB8AC3E}">
-        <p14:creationId xmlns:p14="http://schemas.microsoft.com/office/powerpoint/2010/main" val="3415609305"/>
-      </p:ext>
-    </p:extLst>
-  </p:cSld>
-  <p:clrMapOvr>
-    <a:masterClrMapping/>
-  </p:clrMapOvr>
-</p:sld>
-</file>
-
-<file path=ppt/slides/slide18.xml><?xml version="1.0" encoding="utf-8"?>
-<p:sld xmlns:a="http://schemas.openxmlformats.org/drawingml/2006/main" xmlns:r="http://schemas.openxmlformats.org/officeDocument/2006/relationships" xmlns:p="http://schemas.openxmlformats.org/presentationml/2006/main">
-  <p:cSld>
-    <p:spTree>
-      <p:nvGrpSpPr>
-        <p:cNvPr id="1" name=""/>
-        <p:cNvGrpSpPr/>
-        <p:nvPr/>
-      </p:nvGrpSpPr>
-      <p:grpSpPr>
-        <a:xfrm>
-          <a:off x="0" y="0"/>
-          <a:ext cx="0" cy="0"/>
-          <a:chOff x="0" y="0"/>
-          <a:chExt cx="0" cy="0"/>
-        </a:xfrm>
-      </p:grpSpPr>
-      <p:sp>
-        <p:nvSpPr>
-          <p:cNvPr id="5" name="Espace réservé du texte 4"/>
-          <p:cNvSpPr>
-            <a:spLocks noGrp="1"/>
-          </p:cNvSpPr>
-          <p:nvPr>
-            <p:ph type="body" sz="quarter" idx="13"/>
-          </p:nvPr>
-        </p:nvSpPr>
-        <p:spPr/>
-        <p:txBody>
-          <a:bodyPr/>
-          <a:lstStyle/>
-          <a:p>
-            <a:r>
-              <a:rPr lang="fr-FR" dirty="0"/>
-              <a:t>RESTE A FAIRE</a:t>
-            </a:r>
-          </a:p>
-        </p:txBody>
-      </p:sp>
-      <p:sp>
-        <p:nvSpPr>
-          <p:cNvPr id="7" name="Espace réservé du texte 6"/>
-          <p:cNvSpPr>
-            <a:spLocks noGrp="1"/>
-          </p:cNvSpPr>
-          <p:nvPr>
-            <p:ph type="body" sz="quarter" idx="16"/>
-          </p:nvPr>
-        </p:nvSpPr>
-        <p:spPr>
-          <a:xfrm>
-            <a:off x="611559" y="1105372"/>
-            <a:ext cx="7980505" cy="3614909"/>
-          </a:xfrm>
-        </p:spPr>
-        <p:txBody>
-          <a:bodyPr/>
-          <a:lstStyle/>
-          <a:p>
-            <a:r>
-              <a:rPr lang="fr-FR" dirty="0"/>
-              <a:t>Maitriser la communication UART PIC-PC</a:t>
-            </a:r>
-          </a:p>
-          <a:p>
-            <a:r>
-              <a:rPr lang="fr-FR" dirty="0"/>
-              <a:t>Maitriser la communication UART Raspberry-PIC</a:t>
-            </a:r>
-          </a:p>
-          <a:p>
-            <a:r>
-              <a:rPr lang="fr-FR" dirty="0"/>
-              <a:t>Maitriser l’actionnement des roues</a:t>
-            </a:r>
-          </a:p>
-          <a:p>
-            <a:r>
-              <a:rPr lang="fr-FR" dirty="0"/>
-              <a:t>Implémenter l’algorithme de reconnaissance d’image dans la Raspberry</a:t>
-            </a:r>
-          </a:p>
-          <a:p>
-            <a:r>
-              <a:rPr lang="fr-FR" dirty="0"/>
-              <a:t>Comprendre comment fonctionne l’évaluation des distances et l’implémenter </a:t>
-            </a:r>
-          </a:p>
-        </p:txBody>
-      </p:sp>
-    </p:spTree>
-    <p:extLst>
-      <p:ext uri="{BB962C8B-B14F-4D97-AF65-F5344CB8AC3E}">
-        <p14:creationId xmlns:p14="http://schemas.microsoft.com/office/powerpoint/2010/main" val="1554283246"/>
-      </p:ext>
-    </p:extLst>
-  </p:cSld>
-  <p:clrMapOvr>
-    <a:masterClrMapping/>
-  </p:clrMapOvr>
-</p:sld>
-</file>
-
-<file path=ppt/slides/slide2.xml><?xml version="1.0" encoding="utf-8"?>
-<p:sld xmlns:a="http://schemas.openxmlformats.org/drawingml/2006/main" xmlns:r="http://schemas.openxmlformats.org/officeDocument/2006/relationships" xmlns:p="http://schemas.openxmlformats.org/presentationml/2006/main">
-  <p:cSld>
-    <p:spTree>
-      <p:nvGrpSpPr>
-        <p:cNvPr id="1" name=""/>
-        <p:cNvGrpSpPr/>
-        <p:nvPr/>
-      </p:nvGrpSpPr>
-      <p:grpSpPr>
-        <a:xfrm>
-          <a:off x="0" y="0"/>
-          <a:ext cx="0" cy="0"/>
-          <a:chOff x="0" y="0"/>
-          <a:chExt cx="0" cy="0"/>
-        </a:xfrm>
-      </p:grpSpPr>
-      <p:sp>
-        <p:nvSpPr>
-          <p:cNvPr id="2" name="Titre 1"/>
-          <p:cNvSpPr>
-            <a:spLocks noGrp="1"/>
-          </p:cNvSpPr>
-          <p:nvPr>
-            <p:ph type="title"/>
-          </p:nvPr>
-        </p:nvSpPr>
-        <p:spPr>
-          <a:xfrm>
-            <a:off x="3780753" y="1488323"/>
-            <a:ext cx="4420926" cy="2343781"/>
-          </a:xfrm>
-        </p:spPr>
-        <p:txBody>
-          <a:bodyPr>
-            <a:normAutofit/>
-          </a:bodyPr>
-          <a:lstStyle/>
-          <a:p>
-            <a:r>
-              <a:rPr lang="fr-FR" dirty="0"/>
-              <a:t>Prise en main du sujet et définition des objectifs</a:t>
-            </a:r>
-          </a:p>
-        </p:txBody>
-      </p:sp>
-      <p:sp>
-        <p:nvSpPr>
-          <p:cNvPr id="3" name="Sous-titre 2"/>
-          <p:cNvSpPr>
-            <a:spLocks noGrp="1"/>
-          </p:cNvSpPr>
-          <p:nvPr>
-            <p:ph type="subTitle" idx="13"/>
-          </p:nvPr>
-        </p:nvSpPr>
-        <p:spPr/>
-        <p:txBody>
-          <a:bodyPr/>
-          <a:lstStyle/>
-          <a:p>
-            <a:r>
-              <a:rPr lang="fr-FR" dirty="0"/>
-              <a:t>Etape 1</a:t>
-            </a:r>
-          </a:p>
-        </p:txBody>
-      </p:sp>
-    </p:spTree>
-    <p:extLst>
-      <p:ext uri="{BB962C8B-B14F-4D97-AF65-F5344CB8AC3E}">
-        <p14:creationId xmlns:p14="http://schemas.microsoft.com/office/powerpoint/2010/main" val="3581340210"/>
-      </p:ext>
-    </p:extLst>
-  </p:cSld>
-  <p:clrMapOvr>
-    <a:masterClrMapping/>
-  </p:clrMapOvr>
-</p:sld>
-</file>
-
-<file path=ppt/slides/slide3.xml><?xml version="1.0" encoding="utf-8"?>
-<p:sld xmlns:a="http://schemas.openxmlformats.org/drawingml/2006/main" xmlns:r="http://schemas.openxmlformats.org/officeDocument/2006/relationships" xmlns:p="http://schemas.openxmlformats.org/presentationml/2006/main">
-  <p:cSld>
-    <p:spTree>
-      <p:nvGrpSpPr>
-        <p:cNvPr id="1" name=""/>
-        <p:cNvGrpSpPr/>
-        <p:nvPr/>
-      </p:nvGrpSpPr>
-      <p:grpSpPr>
-        <a:xfrm>
-          <a:off x="0" y="0"/>
-          <a:ext cx="0" cy="0"/>
-          <a:chOff x="0" y="0"/>
-          <a:chExt cx="0" cy="0"/>
-        </a:xfrm>
-      </p:grpSpPr>
-      <p:sp>
-        <p:nvSpPr>
-          <p:cNvPr id="2" name="Titre 1"/>
-          <p:cNvSpPr>
-            <a:spLocks noGrp="1"/>
-          </p:cNvSpPr>
-          <p:nvPr>
-            <p:ph type="title"/>
-          </p:nvPr>
-        </p:nvSpPr>
-        <p:spPr/>
-        <p:txBody>
-          <a:bodyPr/>
-          <a:lstStyle/>
-          <a:p>
-            <a:r>
-              <a:rPr lang="fr-FR" dirty="0"/>
-              <a:t>Etape 1</a:t>
-            </a:r>
-          </a:p>
-        </p:txBody>
-      </p:sp>
-      <p:sp>
-        <p:nvSpPr>
-          <p:cNvPr id="3" name="Espace réservé du contenu 2"/>
-          <p:cNvSpPr>
-            <a:spLocks noGrp="1"/>
-          </p:cNvSpPr>
-          <p:nvPr>
-            <p:ph idx="1"/>
-          </p:nvPr>
-        </p:nvSpPr>
-        <p:spPr/>
-        <p:txBody>
-          <a:bodyPr/>
-          <a:lstStyle/>
-          <a:p>
-            <a:r>
-              <a:rPr lang="fr-FR" dirty="0"/>
-              <a:t>Evaluation des fonctions déjà implémentées dans le robot</a:t>
-            </a:r>
-          </a:p>
-          <a:p>
-            <a:pPr marL="0" indent="0">
-              <a:buNone/>
-            </a:pPr>
-            <a:endParaRPr lang="fr-FR" dirty="0"/>
-          </a:p>
-          <a:p>
-            <a:r>
-              <a:rPr lang="fr-FR" dirty="0"/>
-              <a:t>Evaluation des fonctions à implémenter au cours du projet</a:t>
-            </a:r>
-          </a:p>
-        </p:txBody>
-      </p:sp>
-      <p:sp>
-        <p:nvSpPr>
-          <p:cNvPr id="4" name="Espace réservé du texte 3"/>
-          <p:cNvSpPr>
-            <a:spLocks noGrp="1"/>
-          </p:cNvSpPr>
-          <p:nvPr>
-            <p:ph type="body" sz="quarter" idx="13"/>
-          </p:nvPr>
-        </p:nvSpPr>
-        <p:spPr/>
-        <p:txBody>
-          <a:bodyPr/>
-          <a:lstStyle/>
-          <a:p>
-            <a:r>
-              <a:rPr lang="fr-FR" dirty="0"/>
-              <a:t>Prise en main du sujet</a:t>
-            </a:r>
-          </a:p>
-        </p:txBody>
-      </p:sp>
-    </p:spTree>
-    <p:extLst>
-      <p:ext uri="{BB962C8B-B14F-4D97-AF65-F5344CB8AC3E}">
-        <p14:creationId xmlns:p14="http://schemas.microsoft.com/office/powerpoint/2010/main" val="1881845159"/>
-      </p:ext>
-    </p:extLst>
-  </p:cSld>
-  <p:clrMapOvr>
-    <a:masterClrMapping/>
-  </p:clrMapOvr>
-</p:sld>
-</file>
-
-<file path=ppt/slides/slide4.xml><?xml version="1.0" encoding="utf-8"?>
-<p:sld xmlns:a="http://schemas.openxmlformats.org/drawingml/2006/main" xmlns:r="http://schemas.openxmlformats.org/officeDocument/2006/relationships" xmlns:p="http://schemas.openxmlformats.org/presentationml/2006/main">
-  <p:cSld>
-    <p:spTree>
-      <p:nvGrpSpPr>
-        <p:cNvPr id="1" name=""/>
-        <p:cNvGrpSpPr/>
-        <p:nvPr/>
-      </p:nvGrpSpPr>
-      <p:grpSpPr>
-        <a:xfrm>
-          <a:off x="0" y="0"/>
-          <a:ext cx="0" cy="0"/>
-          <a:chOff x="0" y="0"/>
-          <a:chExt cx="0" cy="0"/>
-        </a:xfrm>
-      </p:grpSpPr>
-      <p:sp>
-        <p:nvSpPr>
-          <p:cNvPr id="2" name="Titre 1"/>
-          <p:cNvSpPr>
-            <a:spLocks noGrp="1"/>
-          </p:cNvSpPr>
-          <p:nvPr>
-            <p:ph type="title"/>
-          </p:nvPr>
-        </p:nvSpPr>
-        <p:spPr/>
-        <p:txBody>
-          <a:bodyPr/>
-          <a:lstStyle/>
-          <a:p>
-            <a:r>
-              <a:rPr lang="fr-FR" dirty="0"/>
-              <a:t>Etape 1</a:t>
-            </a:r>
-          </a:p>
-        </p:txBody>
-      </p:sp>
-      <p:sp>
-        <p:nvSpPr>
-          <p:cNvPr id="3" name="Espace réservé du contenu 2"/>
-          <p:cNvSpPr>
-            <a:spLocks noGrp="1"/>
-          </p:cNvSpPr>
-          <p:nvPr>
-            <p:ph idx="1"/>
-          </p:nvPr>
-        </p:nvSpPr>
-        <p:spPr/>
-        <p:txBody>
-          <a:bodyPr/>
-          <a:lstStyle/>
-          <a:p>
-            <a:r>
-              <a:rPr lang="fr-FR" dirty="0"/>
-              <a:t>Algorithme de reconnaissance d’image </a:t>
-            </a:r>
-          </a:p>
-          <a:p>
-            <a:pPr marL="0" indent="0">
-              <a:buNone/>
-            </a:pPr>
-            <a:endParaRPr lang="fr-FR" dirty="0"/>
-          </a:p>
-          <a:p>
-            <a:r>
-              <a:rPr lang="fr-FR" dirty="0"/>
-              <a:t>Liaison de la reconnaissance d’image et l’évaluation des distances avec le contrôle moteur</a:t>
-            </a:r>
-          </a:p>
-          <a:p>
-            <a:pPr marL="0" indent="0">
-              <a:buNone/>
-            </a:pPr>
-            <a:endParaRPr lang="fr-FR" dirty="0"/>
-          </a:p>
-          <a:p>
-            <a:r>
-              <a:rPr lang="fr-FR" dirty="0"/>
-              <a:t>Algorithme de contrôle des bras</a:t>
-            </a:r>
-          </a:p>
-          <a:p>
-            <a:endParaRPr lang="fr-FR" dirty="0"/>
-          </a:p>
-          <a:p>
-            <a:endParaRPr lang="fr-FR" dirty="0"/>
-          </a:p>
-        </p:txBody>
-      </p:sp>
-      <p:sp>
-        <p:nvSpPr>
-          <p:cNvPr id="4" name="Espace réservé du texte 3"/>
-          <p:cNvSpPr>
-            <a:spLocks noGrp="1"/>
-          </p:cNvSpPr>
-          <p:nvPr>
-            <p:ph type="body" sz="quarter" idx="13"/>
-          </p:nvPr>
-        </p:nvSpPr>
-        <p:spPr>
-          <a:xfrm>
-            <a:off x="317421" y="358311"/>
-            <a:ext cx="6449139" cy="272821"/>
-          </a:xfrm>
-        </p:spPr>
-        <p:txBody>
-          <a:bodyPr>
-            <a:normAutofit/>
-          </a:bodyPr>
-          <a:lstStyle/>
-          <a:p>
-            <a:r>
-              <a:rPr lang="fr-FR" dirty="0"/>
-              <a:t>Prise en main du sujet : fonctions à implémenter</a:t>
-            </a:r>
-          </a:p>
-        </p:txBody>
-      </p:sp>
-    </p:spTree>
-    <p:extLst>
-      <p:ext uri="{BB962C8B-B14F-4D97-AF65-F5344CB8AC3E}">
-        <p14:creationId xmlns:p14="http://schemas.microsoft.com/office/powerpoint/2010/main" val="285527331"/>
-      </p:ext>
-    </p:extLst>
-  </p:cSld>
-  <p:clrMapOvr>
-    <a:masterClrMapping/>
-  </p:clrMapOvr>
-</p:sld>
-</file>
-
-<file path=ppt/slides/slide5.xml><?xml version="1.0" encoding="utf-8"?>
-<p:sld xmlns:a="http://schemas.openxmlformats.org/drawingml/2006/main" xmlns:r="http://schemas.openxmlformats.org/officeDocument/2006/relationships" xmlns:p="http://schemas.openxmlformats.org/presentationml/2006/main">
-  <p:cSld>
-    <p:spTree>
-      <p:nvGrpSpPr>
-        <p:cNvPr id="1" name=""/>
-        <p:cNvGrpSpPr/>
-        <p:nvPr/>
-      </p:nvGrpSpPr>
-      <p:grpSpPr>
-        <a:xfrm>
-          <a:off x="0" y="0"/>
-          <a:ext cx="0" cy="0"/>
-          <a:chOff x="0" y="0"/>
-          <a:chExt cx="0" cy="0"/>
-        </a:xfrm>
-      </p:grpSpPr>
-      <p:sp>
-        <p:nvSpPr>
-          <p:cNvPr id="2" name="Titre 1"/>
-          <p:cNvSpPr>
-            <a:spLocks noGrp="1"/>
-          </p:cNvSpPr>
-          <p:nvPr>
-            <p:ph type="title"/>
-          </p:nvPr>
-        </p:nvSpPr>
-        <p:spPr/>
-        <p:txBody>
-          <a:bodyPr>
-            <a:normAutofit/>
-          </a:bodyPr>
-          <a:lstStyle/>
-          <a:p>
-            <a:r>
-              <a:rPr lang="fr-FR" dirty="0"/>
-              <a:t>Prise en main des outils</a:t>
-            </a:r>
-          </a:p>
-        </p:txBody>
-      </p:sp>
-      <p:sp>
-        <p:nvSpPr>
-          <p:cNvPr id="3" name="Sous-titre 2"/>
-          <p:cNvSpPr>
-            <a:spLocks noGrp="1"/>
-          </p:cNvSpPr>
-          <p:nvPr>
-            <p:ph type="subTitle" idx="13"/>
-          </p:nvPr>
-        </p:nvSpPr>
-        <p:spPr/>
-        <p:txBody>
-          <a:bodyPr/>
-          <a:lstStyle/>
-          <a:p>
-            <a:r>
-              <a:rPr lang="fr-FR" dirty="0"/>
-              <a:t>Etape 2</a:t>
-            </a:r>
-          </a:p>
-        </p:txBody>
-      </p:sp>
-    </p:spTree>
-    <p:extLst>
-      <p:ext uri="{BB962C8B-B14F-4D97-AF65-F5344CB8AC3E}">
-        <p14:creationId xmlns:p14="http://schemas.microsoft.com/office/powerpoint/2010/main" val="585543990"/>
-      </p:ext>
-    </p:extLst>
-  </p:cSld>
-  <p:clrMapOvr>
-    <a:masterClrMapping/>
-  </p:clrMapOvr>
-</p:sld>
-</file>
-
-<file path=ppt/slides/slide6.xml><?xml version="1.0" encoding="utf-8"?>
-<p:sld xmlns:a="http://schemas.openxmlformats.org/drawingml/2006/main" xmlns:r="http://schemas.openxmlformats.org/officeDocument/2006/relationships" xmlns:p="http://schemas.openxmlformats.org/presentationml/2006/main">
-  <p:cSld>
-    <p:spTree>
-      <p:nvGrpSpPr>
-        <p:cNvPr id="1" name=""/>
-        <p:cNvGrpSpPr/>
-        <p:nvPr/>
-      </p:nvGrpSpPr>
-      <p:grpSpPr>
-        <a:xfrm>
-          <a:off x="0" y="0"/>
-          <a:ext cx="0" cy="0"/>
-          <a:chOff x="0" y="0"/>
-          <a:chExt cx="0" cy="0"/>
-        </a:xfrm>
-      </p:grpSpPr>
-      <p:sp>
-        <p:nvSpPr>
-          <p:cNvPr id="2" name="Titre 1"/>
-          <p:cNvSpPr>
-            <a:spLocks noGrp="1"/>
-          </p:cNvSpPr>
-          <p:nvPr>
-            <p:ph type="title"/>
-          </p:nvPr>
-        </p:nvSpPr>
-        <p:spPr/>
-        <p:txBody>
-          <a:bodyPr/>
-          <a:lstStyle/>
-          <a:p>
-            <a:r>
-              <a:rPr lang="fr-FR" dirty="0"/>
-              <a:t>Etape 2</a:t>
-            </a:r>
-          </a:p>
-        </p:txBody>
-      </p:sp>
-      <p:sp>
-        <p:nvSpPr>
-          <p:cNvPr id="3" name="Espace réservé du contenu 2"/>
-          <p:cNvSpPr>
-            <a:spLocks noGrp="1"/>
-          </p:cNvSpPr>
-          <p:nvPr>
-            <p:ph idx="1"/>
-          </p:nvPr>
-        </p:nvSpPr>
-        <p:spPr/>
-        <p:txBody>
-          <a:bodyPr/>
-          <a:lstStyle/>
-          <a:p>
-            <a:r>
-              <a:rPr lang="fr-FR" dirty="0"/>
               <a:t>Programme de contrôle moteur</a:t>
             </a:r>
           </a:p>
@@ -5718,7 +4416,7 @@
 </p:sld>
 </file>
 
-<file path=ppt/slides/slide7.xml><?xml version="1.0" encoding="utf-8"?>
+<file path=ppt/slides/slide11.xml><?xml version="1.0" encoding="utf-8"?>
 <p:sld xmlns:a="http://schemas.openxmlformats.org/drawingml/2006/main" xmlns:r="http://schemas.openxmlformats.org/officeDocument/2006/relationships" xmlns:p="http://schemas.openxmlformats.org/presentationml/2006/main">
   <p:cSld>
     <p:spTree>
@@ -5824,7 +4522,7 @@
 </p:sld>
 </file>
 
-<file path=ppt/slides/slide8.xml><?xml version="1.0" encoding="utf-8"?>
+<file path=ppt/slides/slide12.xml><?xml version="1.0" encoding="utf-8"?>
 <p:sld xmlns:a="http://schemas.openxmlformats.org/drawingml/2006/main" xmlns:r="http://schemas.openxmlformats.org/officeDocument/2006/relationships" xmlns:p="http://schemas.openxmlformats.org/presentationml/2006/main">
   <p:cSld>
     <p:spTree>
@@ -5934,7 +4632,7 @@
 </p:sld>
 </file>
 
-<file path=ppt/slides/slide9.xml><?xml version="1.0" encoding="utf-8"?>
+<file path=ppt/slides/slide13.xml><?xml version="1.0" encoding="utf-8"?>
 <p:sld xmlns:a="http://schemas.openxmlformats.org/drawingml/2006/main" xmlns:r="http://schemas.openxmlformats.org/officeDocument/2006/relationships" xmlns:p="http://schemas.openxmlformats.org/presentationml/2006/main">
   <p:cSld>
     <p:spTree>
@@ -6087,6 +4785,1665 @@
     <p:extLst>
       <p:ext uri="{BB962C8B-B14F-4D97-AF65-F5344CB8AC3E}">
         <p14:creationId xmlns:p14="http://schemas.microsoft.com/office/powerpoint/2010/main" val="3813489020"/>
+      </p:ext>
+    </p:extLst>
+  </p:cSld>
+  <p:clrMapOvr>
+    <a:masterClrMapping/>
+  </p:clrMapOvr>
+</p:sld>
+</file>
+
+<file path=ppt/slides/slide14.xml><?xml version="1.0" encoding="utf-8"?>
+<p:sld xmlns:a="http://schemas.openxmlformats.org/drawingml/2006/main" xmlns:r="http://schemas.openxmlformats.org/officeDocument/2006/relationships" xmlns:p="http://schemas.openxmlformats.org/presentationml/2006/main">
+  <p:cSld>
+    <p:spTree>
+      <p:nvGrpSpPr>
+        <p:cNvPr id="1" name=""/>
+        <p:cNvGrpSpPr/>
+        <p:nvPr/>
+      </p:nvGrpSpPr>
+      <p:grpSpPr>
+        <a:xfrm>
+          <a:off x="0" y="0"/>
+          <a:ext cx="0" cy="0"/>
+          <a:chOff x="0" y="0"/>
+          <a:chExt cx="0" cy="0"/>
+        </a:xfrm>
+      </p:grpSpPr>
+      <p:sp>
+        <p:nvSpPr>
+          <p:cNvPr id="2" name="Titre 1"/>
+          <p:cNvSpPr>
+            <a:spLocks noGrp="1"/>
+          </p:cNvSpPr>
+          <p:nvPr>
+            <p:ph type="title"/>
+          </p:nvPr>
+        </p:nvSpPr>
+        <p:spPr/>
+        <p:txBody>
+          <a:bodyPr/>
+          <a:lstStyle/>
+          <a:p>
+            <a:r>
+              <a:rPr lang="fr-FR" dirty="0"/>
+              <a:t>Etape 2</a:t>
+            </a:r>
+          </a:p>
+        </p:txBody>
+      </p:sp>
+      <p:sp>
+        <p:nvSpPr>
+          <p:cNvPr id="3" name="Espace réservé du contenu 2"/>
+          <p:cNvSpPr>
+            <a:spLocks noGrp="1"/>
+          </p:cNvSpPr>
+          <p:nvPr>
+            <p:ph idx="1"/>
+          </p:nvPr>
+        </p:nvSpPr>
+        <p:spPr/>
+        <p:txBody>
+          <a:bodyPr/>
+          <a:lstStyle/>
+          <a:p>
+            <a:r>
+              <a:rPr lang="fr-FR" dirty="0"/>
+              <a:t>Prise en main du système (navigation, fonctionnement…)</a:t>
+            </a:r>
+          </a:p>
+          <a:p>
+            <a:r>
+              <a:rPr lang="fr-FR" dirty="0"/>
+              <a:t>Mise à jour</a:t>
+            </a:r>
+          </a:p>
+          <a:p>
+            <a:r>
+              <a:rPr lang="fr-FR" dirty="0"/>
+              <a:t>Installations des divers logiciels et librairies nécessaire</a:t>
+            </a:r>
+          </a:p>
+          <a:p>
+            <a:endParaRPr lang="fr-FR" dirty="0"/>
+          </a:p>
+        </p:txBody>
+      </p:sp>
+      <p:sp>
+        <p:nvSpPr>
+          <p:cNvPr id="4" name="Espace réservé du texte 3"/>
+          <p:cNvSpPr>
+            <a:spLocks noGrp="1"/>
+          </p:cNvSpPr>
+          <p:nvPr>
+            <p:ph type="body" sz="quarter" idx="13"/>
+          </p:nvPr>
+        </p:nvSpPr>
+        <p:spPr>
+          <a:xfrm>
+            <a:off x="317421" y="358311"/>
+            <a:ext cx="6449139" cy="272821"/>
+          </a:xfrm>
+        </p:spPr>
+        <p:txBody>
+          <a:bodyPr>
+            <a:normAutofit/>
+          </a:bodyPr>
+          <a:lstStyle/>
+          <a:p>
+            <a:r>
+              <a:rPr lang="fr-FR" dirty="0"/>
+              <a:t>Prise en main des outils : Raspberry Pi</a:t>
+            </a:r>
+          </a:p>
+        </p:txBody>
+      </p:sp>
+    </p:spTree>
+    <p:extLst>
+      <p:ext uri="{BB962C8B-B14F-4D97-AF65-F5344CB8AC3E}">
+        <p14:creationId xmlns:p14="http://schemas.microsoft.com/office/powerpoint/2010/main" val="3662863792"/>
+      </p:ext>
+    </p:extLst>
+  </p:cSld>
+  <p:clrMapOvr>
+    <a:masterClrMapping/>
+  </p:clrMapOvr>
+</p:sld>
+</file>
+
+<file path=ppt/slides/slide15.xml><?xml version="1.0" encoding="utf-8"?>
+<p:sld xmlns:a="http://schemas.openxmlformats.org/drawingml/2006/main" xmlns:r="http://schemas.openxmlformats.org/officeDocument/2006/relationships" xmlns:p="http://schemas.openxmlformats.org/presentationml/2006/main">
+  <p:cSld>
+    <p:spTree>
+      <p:nvGrpSpPr>
+        <p:cNvPr id="1" name=""/>
+        <p:cNvGrpSpPr/>
+        <p:nvPr/>
+      </p:nvGrpSpPr>
+      <p:grpSpPr>
+        <a:xfrm>
+          <a:off x="0" y="0"/>
+          <a:ext cx="0" cy="0"/>
+          <a:chOff x="0" y="0"/>
+          <a:chExt cx="0" cy="0"/>
+        </a:xfrm>
+      </p:grpSpPr>
+      <p:sp>
+        <p:nvSpPr>
+          <p:cNvPr id="2" name="Titre 1"/>
+          <p:cNvSpPr>
+            <a:spLocks noGrp="1"/>
+          </p:cNvSpPr>
+          <p:nvPr>
+            <p:ph type="title"/>
+          </p:nvPr>
+        </p:nvSpPr>
+        <p:spPr/>
+        <p:txBody>
+          <a:bodyPr/>
+          <a:lstStyle/>
+          <a:p>
+            <a:r>
+              <a:rPr lang="fr-FR" dirty="0"/>
+              <a:t>Etape 2</a:t>
+            </a:r>
+          </a:p>
+        </p:txBody>
+      </p:sp>
+      <p:sp>
+        <p:nvSpPr>
+          <p:cNvPr id="5" name="Espace réservé du texte 4"/>
+          <p:cNvSpPr>
+            <a:spLocks noGrp="1"/>
+          </p:cNvSpPr>
+          <p:nvPr>
+            <p:ph type="body" sz="quarter" idx="14"/>
+          </p:nvPr>
+        </p:nvSpPr>
+        <p:spPr>
+          <a:xfrm>
+            <a:off x="317421" y="358311"/>
+            <a:ext cx="4966555" cy="272821"/>
+          </a:xfrm>
+        </p:spPr>
+        <p:txBody>
+          <a:bodyPr>
+            <a:normAutofit fontScale="85000" lnSpcReduction="10000"/>
+          </a:bodyPr>
+          <a:lstStyle/>
+          <a:p>
+            <a:r>
+              <a:rPr lang="fr-FR" dirty="0"/>
+              <a:t>Prise en main des outils : communication UART </a:t>
+            </a:r>
+            <a:r>
+              <a:rPr lang="fr-FR" dirty="0" err="1"/>
+              <a:t>Rasp-Rasp</a:t>
+            </a:r>
+            <a:endParaRPr lang="fr-FR" dirty="0"/>
+          </a:p>
+        </p:txBody>
+      </p:sp>
+      <p:pic>
+        <p:nvPicPr>
+          <p:cNvPr id="11" name="Espace réservé du contenu 4"/>
+          <p:cNvPicPr>
+            <a:picLocks noGrp="1" noChangeAspect="1"/>
+          </p:cNvPicPr>
+          <p:nvPr>
+            <p:ph type="chart" sz="quarter" idx="15"/>
+          </p:nvPr>
+        </p:nvPicPr>
+        <p:blipFill>
+          <a:blip r:embed="rId2">
+            <a:extLst>
+              <a:ext uri="{28A0092B-C50C-407E-A947-70E740481C1C}">
+                <a14:useLocalDpi xmlns:a14="http://schemas.microsoft.com/office/drawing/2010/main" val="0"/>
+              </a:ext>
+            </a:extLst>
+          </a:blip>
+          <a:stretch>
+            <a:fillRect/>
+          </a:stretch>
+        </p:blipFill>
+        <p:spPr>
+          <a:xfrm>
+            <a:off x="2102077" y="1467196"/>
+            <a:ext cx="4207270" cy="2637761"/>
+          </a:xfrm>
+        </p:spPr>
+      </p:pic>
+    </p:spTree>
+    <p:extLst>
+      <p:ext uri="{BB962C8B-B14F-4D97-AF65-F5344CB8AC3E}">
+        <p14:creationId xmlns:p14="http://schemas.microsoft.com/office/powerpoint/2010/main" val="254268587"/>
+      </p:ext>
+    </p:extLst>
+  </p:cSld>
+  <p:clrMapOvr>
+    <a:masterClrMapping/>
+  </p:clrMapOvr>
+</p:sld>
+</file>
+
+<file path=ppt/slides/slide16.xml><?xml version="1.0" encoding="utf-8"?>
+<p:sld xmlns:a="http://schemas.openxmlformats.org/drawingml/2006/main" xmlns:r="http://schemas.openxmlformats.org/officeDocument/2006/relationships" xmlns:p="http://schemas.openxmlformats.org/presentationml/2006/main">
+  <p:cSld>
+    <p:spTree>
+      <p:nvGrpSpPr>
+        <p:cNvPr id="1" name=""/>
+        <p:cNvGrpSpPr/>
+        <p:nvPr/>
+      </p:nvGrpSpPr>
+      <p:grpSpPr>
+        <a:xfrm>
+          <a:off x="0" y="0"/>
+          <a:ext cx="0" cy="0"/>
+          <a:chOff x="0" y="0"/>
+          <a:chExt cx="0" cy="0"/>
+        </a:xfrm>
+      </p:grpSpPr>
+      <p:sp>
+        <p:nvSpPr>
+          <p:cNvPr id="2" name="Titre 1"/>
+          <p:cNvSpPr>
+            <a:spLocks noGrp="1"/>
+          </p:cNvSpPr>
+          <p:nvPr>
+            <p:ph type="title"/>
+          </p:nvPr>
+        </p:nvSpPr>
+        <p:spPr/>
+        <p:txBody>
+          <a:bodyPr/>
+          <a:lstStyle/>
+          <a:p>
+            <a:r>
+              <a:rPr lang="fr-FR" dirty="0"/>
+              <a:t>Etape 2</a:t>
+            </a:r>
+          </a:p>
+        </p:txBody>
+      </p:sp>
+      <p:sp>
+        <p:nvSpPr>
+          <p:cNvPr id="4" name="Espace réservé du texte 3"/>
+          <p:cNvSpPr>
+            <a:spLocks noGrp="1"/>
+          </p:cNvSpPr>
+          <p:nvPr>
+            <p:ph type="body" sz="quarter" idx="3"/>
+          </p:nvPr>
+        </p:nvSpPr>
+        <p:spPr>
+          <a:xfrm>
+            <a:off x="4346598" y="1478691"/>
+            <a:ext cx="4254668" cy="2820340"/>
+          </a:xfrm>
+        </p:spPr>
+        <p:txBody>
+          <a:bodyPr/>
+          <a:lstStyle/>
+          <a:p>
+            <a:r>
+              <a:rPr lang="fr-FR" dirty="0"/>
+              <a:t>Envoie de commande depuis le PC</a:t>
+            </a:r>
+          </a:p>
+          <a:p>
+            <a:r>
+              <a:rPr lang="fr-FR" dirty="0"/>
+              <a:t>Réception des commandes sur le PIC</a:t>
+            </a:r>
+          </a:p>
+          <a:p>
+            <a:r>
+              <a:rPr lang="fr-FR" dirty="0"/>
+              <a:t>Réponse du PIC vers le PC</a:t>
+            </a:r>
+          </a:p>
+        </p:txBody>
+      </p:sp>
+      <p:sp>
+        <p:nvSpPr>
+          <p:cNvPr id="5" name="Espace réservé du texte 4"/>
+          <p:cNvSpPr>
+            <a:spLocks noGrp="1"/>
+          </p:cNvSpPr>
+          <p:nvPr>
+            <p:ph type="body" sz="quarter" idx="14"/>
+          </p:nvPr>
+        </p:nvSpPr>
+        <p:spPr>
+          <a:xfrm>
+            <a:off x="317421" y="358311"/>
+            <a:ext cx="4966555" cy="272821"/>
+          </a:xfrm>
+        </p:spPr>
+        <p:txBody>
+          <a:bodyPr>
+            <a:normAutofit fontScale="92500"/>
+          </a:bodyPr>
+          <a:lstStyle/>
+          <a:p>
+            <a:r>
+              <a:rPr lang="fr-FR" dirty="0"/>
+              <a:t>Prise en main des outils : communication UART PC-PIC</a:t>
+            </a:r>
+          </a:p>
+        </p:txBody>
+      </p:sp>
+      <p:pic>
+        <p:nvPicPr>
+          <p:cNvPr id="17" name="Image 16" descr="Une image contenant capture d’écran&#10;&#10;Description générée automatiquement">
+            <a:extLst>
+              <a:ext uri="{FF2B5EF4-FFF2-40B4-BE49-F238E27FC236}">
+                <a16:creationId xmlns:a16="http://schemas.microsoft.com/office/drawing/2014/main" id="{DC69F3F3-CDB0-4BD8-BE00-78FD8A584B66}"/>
+              </a:ext>
+            </a:extLst>
+          </p:cNvPr>
+          <p:cNvPicPr>
+            <a:picLocks noChangeAspect="1"/>
+          </p:cNvPicPr>
+          <p:nvPr/>
+        </p:nvPicPr>
+        <p:blipFill>
+          <a:blip r:embed="rId2"/>
+          <a:stretch>
+            <a:fillRect/>
+          </a:stretch>
+        </p:blipFill>
+        <p:spPr>
+          <a:xfrm>
+            <a:off x="542734" y="1478691"/>
+            <a:ext cx="3634056" cy="2689655"/>
+          </a:xfrm>
+          <a:prstGeom prst="rect">
+            <a:avLst/>
+          </a:prstGeom>
+          <a:ln w="57150">
+            <a:solidFill>
+              <a:srgbClr val="3198E5"/>
+            </a:solidFill>
+          </a:ln>
+        </p:spPr>
+      </p:pic>
+    </p:spTree>
+    <p:extLst>
+      <p:ext uri="{BB962C8B-B14F-4D97-AF65-F5344CB8AC3E}">
+        <p14:creationId xmlns:p14="http://schemas.microsoft.com/office/powerpoint/2010/main" val="2436744945"/>
+      </p:ext>
+    </p:extLst>
+  </p:cSld>
+  <p:clrMapOvr>
+    <a:masterClrMapping/>
+  </p:clrMapOvr>
+</p:sld>
+</file>
+
+<file path=ppt/slides/slide17.xml><?xml version="1.0" encoding="utf-8"?>
+<p:sld xmlns:a="http://schemas.openxmlformats.org/drawingml/2006/main" xmlns:r="http://schemas.openxmlformats.org/officeDocument/2006/relationships" xmlns:p="http://schemas.openxmlformats.org/presentationml/2006/main">
+  <p:cSld>
+    <p:spTree>
+      <p:nvGrpSpPr>
+        <p:cNvPr id="1" name=""/>
+        <p:cNvGrpSpPr/>
+        <p:nvPr/>
+      </p:nvGrpSpPr>
+      <p:grpSpPr>
+        <a:xfrm>
+          <a:off x="0" y="0"/>
+          <a:ext cx="0" cy="0"/>
+          <a:chOff x="0" y="0"/>
+          <a:chExt cx="0" cy="0"/>
+        </a:xfrm>
+      </p:grpSpPr>
+      <p:sp>
+        <p:nvSpPr>
+          <p:cNvPr id="2" name="Titre 1"/>
+          <p:cNvSpPr>
+            <a:spLocks noGrp="1"/>
+          </p:cNvSpPr>
+          <p:nvPr>
+            <p:ph type="title"/>
+          </p:nvPr>
+        </p:nvSpPr>
+        <p:spPr/>
+        <p:txBody>
+          <a:bodyPr/>
+          <a:lstStyle/>
+          <a:p>
+            <a:r>
+              <a:rPr lang="fr-FR" dirty="0"/>
+              <a:t>Etape 2</a:t>
+            </a:r>
+          </a:p>
+        </p:txBody>
+      </p:sp>
+      <p:sp>
+        <p:nvSpPr>
+          <p:cNvPr id="4" name="Espace réservé du texte 3"/>
+          <p:cNvSpPr>
+            <a:spLocks noGrp="1"/>
+          </p:cNvSpPr>
+          <p:nvPr>
+            <p:ph type="body" sz="quarter" idx="13"/>
+          </p:nvPr>
+        </p:nvSpPr>
+        <p:spPr>
+          <a:xfrm>
+            <a:off x="317421" y="358311"/>
+            <a:ext cx="6449139" cy="272821"/>
+          </a:xfrm>
+        </p:spPr>
+        <p:txBody>
+          <a:bodyPr>
+            <a:normAutofit/>
+          </a:bodyPr>
+          <a:lstStyle/>
+          <a:p>
+            <a:r>
+              <a:rPr lang="fr-FR" dirty="0"/>
+              <a:t>Prise en main des outils : Flux vidéo</a:t>
+            </a:r>
+          </a:p>
+        </p:txBody>
+      </p:sp>
+      <p:sp>
+        <p:nvSpPr>
+          <p:cNvPr id="3" name="Espace réservé du contenu 2"/>
+          <p:cNvSpPr>
+            <a:spLocks noGrp="1"/>
+          </p:cNvSpPr>
+          <p:nvPr>
+            <p:ph idx="1"/>
+          </p:nvPr>
+        </p:nvSpPr>
+        <p:spPr/>
+        <p:txBody>
+          <a:bodyPr/>
+          <a:lstStyle/>
+          <a:p>
+            <a:r>
+              <a:rPr lang="fr-FR" dirty="0"/>
+              <a:t>Récupération en direct du signal vidéo</a:t>
+            </a:r>
+          </a:p>
+          <a:p>
+            <a:r>
+              <a:rPr lang="fr-FR" dirty="0"/>
+              <a:t>Sauvegarde exploitable du signal vidéo</a:t>
+            </a:r>
+          </a:p>
+          <a:p>
+            <a:pPr marL="0" indent="0">
+              <a:buNone/>
+            </a:pPr>
+            <a:endParaRPr lang="fr-FR" dirty="0"/>
+          </a:p>
+        </p:txBody>
+      </p:sp>
+    </p:spTree>
+    <p:extLst>
+      <p:ext uri="{BB962C8B-B14F-4D97-AF65-F5344CB8AC3E}">
+        <p14:creationId xmlns:p14="http://schemas.microsoft.com/office/powerpoint/2010/main" val="4231106049"/>
+      </p:ext>
+    </p:extLst>
+  </p:cSld>
+  <p:clrMapOvr>
+    <a:masterClrMapping/>
+  </p:clrMapOvr>
+</p:sld>
+</file>
+
+<file path=ppt/slides/slide18.xml><?xml version="1.0" encoding="utf-8"?>
+<p:sld xmlns:a="http://schemas.openxmlformats.org/drawingml/2006/main" xmlns:r="http://schemas.openxmlformats.org/officeDocument/2006/relationships" xmlns:p="http://schemas.openxmlformats.org/presentationml/2006/main">
+  <p:cSld>
+    <p:spTree>
+      <p:nvGrpSpPr>
+        <p:cNvPr id="1" name=""/>
+        <p:cNvGrpSpPr/>
+        <p:nvPr/>
+      </p:nvGrpSpPr>
+      <p:grpSpPr>
+        <a:xfrm>
+          <a:off x="0" y="0"/>
+          <a:ext cx="0" cy="0"/>
+          <a:chOff x="0" y="0"/>
+          <a:chExt cx="0" cy="0"/>
+        </a:xfrm>
+      </p:grpSpPr>
+      <p:sp>
+        <p:nvSpPr>
+          <p:cNvPr id="2" name="Titre 1"/>
+          <p:cNvSpPr>
+            <a:spLocks noGrp="1"/>
+          </p:cNvSpPr>
+          <p:nvPr>
+            <p:ph type="title"/>
+          </p:nvPr>
+        </p:nvSpPr>
+        <p:spPr>
+          <a:xfrm>
+            <a:off x="3780753" y="1488323"/>
+            <a:ext cx="4280049" cy="1291587"/>
+          </a:xfrm>
+        </p:spPr>
+        <p:txBody>
+          <a:bodyPr>
+            <a:normAutofit/>
+          </a:bodyPr>
+          <a:lstStyle/>
+          <a:p>
+            <a:r>
+              <a:rPr lang="fr-FR" dirty="0"/>
+              <a:t>Problèmes rencontrés</a:t>
+            </a:r>
+          </a:p>
+        </p:txBody>
+      </p:sp>
+    </p:spTree>
+    <p:extLst>
+      <p:ext uri="{BB962C8B-B14F-4D97-AF65-F5344CB8AC3E}">
+        <p14:creationId xmlns:p14="http://schemas.microsoft.com/office/powerpoint/2010/main" val="1436300240"/>
+      </p:ext>
+    </p:extLst>
+  </p:cSld>
+  <p:clrMapOvr>
+    <a:masterClrMapping/>
+  </p:clrMapOvr>
+</p:sld>
+</file>
+
+<file path=ppt/slides/slide19.xml><?xml version="1.0" encoding="utf-8"?>
+<p:sld xmlns:a="http://schemas.openxmlformats.org/drawingml/2006/main" xmlns:r="http://schemas.openxmlformats.org/officeDocument/2006/relationships" xmlns:p="http://schemas.openxmlformats.org/presentationml/2006/main">
+  <p:cSld>
+    <p:spTree>
+      <p:nvGrpSpPr>
+        <p:cNvPr id="1" name=""/>
+        <p:cNvGrpSpPr/>
+        <p:nvPr/>
+      </p:nvGrpSpPr>
+      <p:grpSpPr>
+        <a:xfrm>
+          <a:off x="0" y="0"/>
+          <a:ext cx="0" cy="0"/>
+          <a:chOff x="0" y="0"/>
+          <a:chExt cx="0" cy="0"/>
+        </a:xfrm>
+      </p:grpSpPr>
+      <p:sp>
+        <p:nvSpPr>
+          <p:cNvPr id="3" name="Espace réservé du contenu 2"/>
+          <p:cNvSpPr>
+            <a:spLocks noGrp="1"/>
+          </p:cNvSpPr>
+          <p:nvPr>
+            <p:ph idx="1"/>
+          </p:nvPr>
+        </p:nvSpPr>
+        <p:spPr/>
+        <p:txBody>
+          <a:bodyPr/>
+          <a:lstStyle/>
+          <a:p>
+            <a:r>
+              <a:rPr lang="fr-FR" dirty="0"/>
+              <a:t>Compréhension du firmware</a:t>
+            </a:r>
+          </a:p>
+          <a:p>
+            <a:r>
+              <a:rPr lang="fr-FR" dirty="0"/>
+              <a:t>Communication UART PC-PIC</a:t>
+            </a:r>
+          </a:p>
+          <a:p>
+            <a:r>
+              <a:rPr lang="fr-FR" dirty="0"/>
+              <a:t>Communication UART </a:t>
+            </a:r>
+            <a:r>
+              <a:rPr lang="fr-FR" dirty="0" err="1"/>
+              <a:t>Rasp-Rasp</a:t>
+            </a:r>
+            <a:endParaRPr lang="fr-FR" dirty="0"/>
+          </a:p>
+          <a:p>
+            <a:r>
+              <a:rPr lang="fr-FR" dirty="0"/>
+              <a:t>Compatibilité de version entre différents logiciels sur la Raspberry</a:t>
+            </a:r>
+          </a:p>
+          <a:p>
+            <a:r>
+              <a:rPr lang="fr-FR" dirty="0"/>
+              <a:t>Problème de boot Raspberry</a:t>
+            </a:r>
+          </a:p>
+          <a:p>
+            <a:r>
+              <a:rPr lang="fr-FR" dirty="0"/>
+              <a:t>Problème de mémoire SD Raspberry</a:t>
+            </a:r>
+          </a:p>
+        </p:txBody>
+      </p:sp>
+      <p:sp>
+        <p:nvSpPr>
+          <p:cNvPr id="4" name="Espace réservé du texte 3"/>
+          <p:cNvSpPr>
+            <a:spLocks noGrp="1"/>
+          </p:cNvSpPr>
+          <p:nvPr>
+            <p:ph type="body" sz="quarter" idx="13"/>
+          </p:nvPr>
+        </p:nvSpPr>
+        <p:spPr>
+          <a:xfrm>
+            <a:off x="317421" y="358311"/>
+            <a:ext cx="6449139" cy="272821"/>
+          </a:xfrm>
+        </p:spPr>
+        <p:txBody>
+          <a:bodyPr>
+            <a:normAutofit/>
+          </a:bodyPr>
+          <a:lstStyle/>
+          <a:p>
+            <a:r>
+              <a:rPr lang="fr-FR" dirty="0"/>
+              <a:t>PROBLEMES RENCONTRES : TECHNIQUE</a:t>
+            </a:r>
+          </a:p>
+        </p:txBody>
+      </p:sp>
+    </p:spTree>
+    <p:extLst>
+      <p:ext uri="{BB962C8B-B14F-4D97-AF65-F5344CB8AC3E}">
+        <p14:creationId xmlns:p14="http://schemas.microsoft.com/office/powerpoint/2010/main" val="1085629461"/>
+      </p:ext>
+    </p:extLst>
+  </p:cSld>
+  <p:clrMapOvr>
+    <a:masterClrMapping/>
+  </p:clrMapOvr>
+</p:sld>
+</file>
+
+<file path=ppt/slides/slide2.xml><?xml version="1.0" encoding="utf-8"?>
+<p:sld xmlns:a="http://schemas.openxmlformats.org/drawingml/2006/main" xmlns:r="http://schemas.openxmlformats.org/officeDocument/2006/relationships" xmlns:p="http://schemas.openxmlformats.org/presentationml/2006/main">
+  <p:cSld>
+    <p:spTree>
+      <p:nvGrpSpPr>
+        <p:cNvPr id="1" name=""/>
+        <p:cNvGrpSpPr/>
+        <p:nvPr/>
+      </p:nvGrpSpPr>
+      <p:grpSpPr>
+        <a:xfrm>
+          <a:off x="0" y="0"/>
+          <a:ext cx="0" cy="0"/>
+          <a:chOff x="0" y="0"/>
+          <a:chExt cx="0" cy="0"/>
+        </a:xfrm>
+      </p:grpSpPr>
+      <p:sp>
+        <p:nvSpPr>
+          <p:cNvPr id="2" name="Titre 1"/>
+          <p:cNvSpPr>
+            <a:spLocks noGrp="1"/>
+          </p:cNvSpPr>
+          <p:nvPr>
+            <p:ph type="title"/>
+          </p:nvPr>
+        </p:nvSpPr>
+        <p:spPr>
+          <a:xfrm>
+            <a:off x="3705691" y="1488323"/>
+            <a:ext cx="4420926" cy="2343781"/>
+          </a:xfrm>
+        </p:spPr>
+        <p:txBody>
+          <a:bodyPr>
+            <a:normAutofit/>
+          </a:bodyPr>
+          <a:lstStyle/>
+          <a:p>
+            <a:r>
+              <a:rPr lang="fr-FR" dirty="0" smtClean="0"/>
+              <a:t>Présentation du sujet</a:t>
+            </a:r>
+            <a:endParaRPr lang="fr-FR" dirty="0"/>
+          </a:p>
+        </p:txBody>
+      </p:sp>
+      <p:sp>
+        <p:nvSpPr>
+          <p:cNvPr id="3" name="Sous-titre 2"/>
+          <p:cNvSpPr>
+            <a:spLocks noGrp="1"/>
+          </p:cNvSpPr>
+          <p:nvPr>
+            <p:ph type="subTitle" idx="13"/>
+          </p:nvPr>
+        </p:nvSpPr>
+        <p:spPr/>
+        <p:txBody>
+          <a:bodyPr/>
+          <a:lstStyle/>
+          <a:p>
+            <a:r>
+              <a:rPr lang="fr-FR" dirty="0"/>
+              <a:t>Etape 1</a:t>
+            </a:r>
+          </a:p>
+        </p:txBody>
+      </p:sp>
+    </p:spTree>
+    <p:extLst>
+      <p:ext uri="{BB962C8B-B14F-4D97-AF65-F5344CB8AC3E}">
+        <p14:creationId xmlns:p14="http://schemas.microsoft.com/office/powerpoint/2010/main" val="3581340210"/>
+      </p:ext>
+    </p:extLst>
+  </p:cSld>
+  <p:clrMapOvr>
+    <a:masterClrMapping/>
+  </p:clrMapOvr>
+</p:sld>
+</file>
+
+<file path=ppt/slides/slide20.xml><?xml version="1.0" encoding="utf-8"?>
+<p:sld xmlns:a="http://schemas.openxmlformats.org/drawingml/2006/main" xmlns:r="http://schemas.openxmlformats.org/officeDocument/2006/relationships" xmlns:p="http://schemas.openxmlformats.org/presentationml/2006/main">
+  <p:cSld>
+    <p:spTree>
+      <p:nvGrpSpPr>
+        <p:cNvPr id="1" name=""/>
+        <p:cNvGrpSpPr/>
+        <p:nvPr/>
+      </p:nvGrpSpPr>
+      <p:grpSpPr>
+        <a:xfrm>
+          <a:off x="0" y="0"/>
+          <a:ext cx="0" cy="0"/>
+          <a:chOff x="0" y="0"/>
+          <a:chExt cx="0" cy="0"/>
+        </a:xfrm>
+      </p:grpSpPr>
+      <p:sp>
+        <p:nvSpPr>
+          <p:cNvPr id="3" name="Espace réservé du contenu 2"/>
+          <p:cNvSpPr>
+            <a:spLocks noGrp="1"/>
+          </p:cNvSpPr>
+          <p:nvPr>
+            <p:ph idx="1"/>
+          </p:nvPr>
+        </p:nvSpPr>
+        <p:spPr/>
+        <p:txBody>
+          <a:bodyPr/>
+          <a:lstStyle/>
+          <a:p>
+            <a:r>
+              <a:rPr lang="fr-FR" dirty="0"/>
+              <a:t>Gestion du temps</a:t>
+            </a:r>
+          </a:p>
+          <a:p>
+            <a:r>
+              <a:rPr lang="fr-FR" dirty="0"/>
+              <a:t>Gestion des objectifs</a:t>
+            </a:r>
+          </a:p>
+        </p:txBody>
+      </p:sp>
+      <p:sp>
+        <p:nvSpPr>
+          <p:cNvPr id="4" name="Espace réservé du texte 3"/>
+          <p:cNvSpPr>
+            <a:spLocks noGrp="1"/>
+          </p:cNvSpPr>
+          <p:nvPr>
+            <p:ph type="body" sz="quarter" idx="13"/>
+          </p:nvPr>
+        </p:nvSpPr>
+        <p:spPr>
+          <a:xfrm>
+            <a:off x="317421" y="358311"/>
+            <a:ext cx="6449139" cy="272821"/>
+          </a:xfrm>
+        </p:spPr>
+        <p:txBody>
+          <a:bodyPr>
+            <a:normAutofit/>
+          </a:bodyPr>
+          <a:lstStyle/>
+          <a:p>
+            <a:r>
+              <a:rPr lang="fr-FR" dirty="0"/>
+              <a:t>PROBLEMES RENCONTRES : GESTION DE PROJET</a:t>
+            </a:r>
+          </a:p>
+        </p:txBody>
+      </p:sp>
+    </p:spTree>
+    <p:extLst>
+      <p:ext uri="{BB962C8B-B14F-4D97-AF65-F5344CB8AC3E}">
+        <p14:creationId xmlns:p14="http://schemas.microsoft.com/office/powerpoint/2010/main" val="616241262"/>
+      </p:ext>
+    </p:extLst>
+  </p:cSld>
+  <p:clrMapOvr>
+    <a:masterClrMapping/>
+  </p:clrMapOvr>
+</p:sld>
+</file>
+
+<file path=ppt/slides/slide21.xml><?xml version="1.0" encoding="utf-8"?>
+<p:sld xmlns:a="http://schemas.openxmlformats.org/drawingml/2006/main" xmlns:r="http://schemas.openxmlformats.org/officeDocument/2006/relationships" xmlns:p="http://schemas.openxmlformats.org/presentationml/2006/main">
+  <p:cSld>
+    <p:spTree>
+      <p:nvGrpSpPr>
+        <p:cNvPr id="1" name=""/>
+        <p:cNvGrpSpPr/>
+        <p:nvPr/>
+      </p:nvGrpSpPr>
+      <p:grpSpPr>
+        <a:xfrm>
+          <a:off x="0" y="0"/>
+          <a:ext cx="0" cy="0"/>
+          <a:chOff x="0" y="0"/>
+          <a:chExt cx="0" cy="0"/>
+        </a:xfrm>
+      </p:grpSpPr>
+      <p:sp>
+        <p:nvSpPr>
+          <p:cNvPr id="2" name="Titre 1"/>
+          <p:cNvSpPr>
+            <a:spLocks noGrp="1"/>
+          </p:cNvSpPr>
+          <p:nvPr>
+            <p:ph type="title"/>
+          </p:nvPr>
+        </p:nvSpPr>
+        <p:spPr/>
+        <p:txBody>
+          <a:bodyPr>
+            <a:normAutofit/>
+          </a:bodyPr>
+          <a:lstStyle/>
+          <a:p>
+            <a:r>
+              <a:rPr lang="fr-FR" dirty="0"/>
+              <a:t>Reste à faire</a:t>
+            </a:r>
+          </a:p>
+        </p:txBody>
+      </p:sp>
+    </p:spTree>
+    <p:extLst>
+      <p:ext uri="{BB962C8B-B14F-4D97-AF65-F5344CB8AC3E}">
+        <p14:creationId xmlns:p14="http://schemas.microsoft.com/office/powerpoint/2010/main" val="3415609305"/>
+      </p:ext>
+    </p:extLst>
+  </p:cSld>
+  <p:clrMapOvr>
+    <a:masterClrMapping/>
+  </p:clrMapOvr>
+</p:sld>
+</file>
+
+<file path=ppt/slides/slide22.xml><?xml version="1.0" encoding="utf-8"?>
+<p:sld xmlns:a="http://schemas.openxmlformats.org/drawingml/2006/main" xmlns:r="http://schemas.openxmlformats.org/officeDocument/2006/relationships" xmlns:p="http://schemas.openxmlformats.org/presentationml/2006/main">
+  <p:cSld>
+    <p:spTree>
+      <p:nvGrpSpPr>
+        <p:cNvPr id="1" name=""/>
+        <p:cNvGrpSpPr/>
+        <p:nvPr/>
+      </p:nvGrpSpPr>
+      <p:grpSpPr>
+        <a:xfrm>
+          <a:off x="0" y="0"/>
+          <a:ext cx="0" cy="0"/>
+          <a:chOff x="0" y="0"/>
+          <a:chExt cx="0" cy="0"/>
+        </a:xfrm>
+      </p:grpSpPr>
+      <p:sp>
+        <p:nvSpPr>
+          <p:cNvPr id="5" name="Espace réservé du texte 4"/>
+          <p:cNvSpPr>
+            <a:spLocks noGrp="1"/>
+          </p:cNvSpPr>
+          <p:nvPr>
+            <p:ph type="body" sz="quarter" idx="13"/>
+          </p:nvPr>
+        </p:nvSpPr>
+        <p:spPr/>
+        <p:txBody>
+          <a:bodyPr/>
+          <a:lstStyle/>
+          <a:p>
+            <a:r>
+              <a:rPr lang="fr-FR" dirty="0"/>
+              <a:t>RESTE A FAIRE</a:t>
+            </a:r>
+          </a:p>
+        </p:txBody>
+      </p:sp>
+      <p:sp>
+        <p:nvSpPr>
+          <p:cNvPr id="7" name="Espace réservé du texte 6"/>
+          <p:cNvSpPr>
+            <a:spLocks noGrp="1"/>
+          </p:cNvSpPr>
+          <p:nvPr>
+            <p:ph type="body" sz="quarter" idx="16"/>
+          </p:nvPr>
+        </p:nvSpPr>
+        <p:spPr>
+          <a:xfrm>
+            <a:off x="611559" y="1105372"/>
+            <a:ext cx="7980505" cy="3614909"/>
+          </a:xfrm>
+        </p:spPr>
+        <p:txBody>
+          <a:bodyPr/>
+          <a:lstStyle/>
+          <a:p>
+            <a:r>
+              <a:rPr lang="fr-FR" dirty="0"/>
+              <a:t>Maitriser la communication UART PIC-PC</a:t>
+            </a:r>
+          </a:p>
+          <a:p>
+            <a:r>
+              <a:rPr lang="fr-FR" dirty="0"/>
+              <a:t>Maitriser la communication UART Raspberry-PIC</a:t>
+            </a:r>
+          </a:p>
+          <a:p>
+            <a:r>
+              <a:rPr lang="fr-FR" dirty="0"/>
+              <a:t>Maitriser l’actionnement des roues</a:t>
+            </a:r>
+          </a:p>
+          <a:p>
+            <a:r>
+              <a:rPr lang="fr-FR" dirty="0"/>
+              <a:t>Implémenter l’algorithme de reconnaissance d’image dans la Raspberry</a:t>
+            </a:r>
+          </a:p>
+          <a:p>
+            <a:r>
+              <a:rPr lang="fr-FR" dirty="0"/>
+              <a:t>Comprendre comment fonctionne l’évaluation des distances et l’implémenter </a:t>
+            </a:r>
+          </a:p>
+        </p:txBody>
+      </p:sp>
+    </p:spTree>
+    <p:extLst>
+      <p:ext uri="{BB962C8B-B14F-4D97-AF65-F5344CB8AC3E}">
+        <p14:creationId xmlns:p14="http://schemas.microsoft.com/office/powerpoint/2010/main" val="1554283246"/>
+      </p:ext>
+    </p:extLst>
+  </p:cSld>
+  <p:clrMapOvr>
+    <a:masterClrMapping/>
+  </p:clrMapOvr>
+</p:sld>
+</file>
+
+<file path=ppt/slides/slide3.xml><?xml version="1.0" encoding="utf-8"?>
+<p:sld xmlns:a="http://schemas.openxmlformats.org/drawingml/2006/main" xmlns:r="http://schemas.openxmlformats.org/officeDocument/2006/relationships" xmlns:p="http://schemas.openxmlformats.org/presentationml/2006/main">
+  <p:cSld>
+    <p:spTree>
+      <p:nvGrpSpPr>
+        <p:cNvPr id="1" name=""/>
+        <p:cNvGrpSpPr/>
+        <p:nvPr/>
+      </p:nvGrpSpPr>
+      <p:grpSpPr>
+        <a:xfrm>
+          <a:off x="0" y="0"/>
+          <a:ext cx="0" cy="0"/>
+          <a:chOff x="0" y="0"/>
+          <a:chExt cx="0" cy="0"/>
+        </a:xfrm>
+      </p:grpSpPr>
+      <p:sp>
+        <p:nvSpPr>
+          <p:cNvPr id="2" name="Titre 1"/>
+          <p:cNvSpPr>
+            <a:spLocks noGrp="1"/>
+          </p:cNvSpPr>
+          <p:nvPr>
+            <p:ph type="title"/>
+          </p:nvPr>
+        </p:nvSpPr>
+        <p:spPr/>
+        <p:txBody>
+          <a:bodyPr/>
+          <a:lstStyle/>
+          <a:p>
+            <a:r>
+              <a:rPr lang="fr-FR" dirty="0"/>
+              <a:t>Etape 1</a:t>
+            </a:r>
+          </a:p>
+        </p:txBody>
+      </p:sp>
+      <p:sp>
+        <p:nvSpPr>
+          <p:cNvPr id="3" name="Espace réservé du contenu 2"/>
+          <p:cNvSpPr>
+            <a:spLocks noGrp="1"/>
+          </p:cNvSpPr>
+          <p:nvPr>
+            <p:ph idx="1"/>
+          </p:nvPr>
+        </p:nvSpPr>
+        <p:spPr/>
+        <p:txBody>
+          <a:bodyPr/>
+          <a:lstStyle/>
+          <a:p>
+            <a:r>
+              <a:rPr lang="fr-FR" sz="1800" dirty="0" smtClean="0"/>
+              <a:t>Réceptionner le flux vidéo de la caméra</a:t>
+            </a:r>
+          </a:p>
+          <a:p>
+            <a:endParaRPr lang="fr-FR" sz="1800" dirty="0"/>
+          </a:p>
+          <a:p>
+            <a:r>
+              <a:rPr lang="fr-FR" sz="1800" dirty="0" smtClean="0"/>
+              <a:t>Implémenter </a:t>
+            </a:r>
+            <a:r>
+              <a:rPr lang="fr-FR" sz="1800" dirty="0"/>
+              <a:t>un algorithme de reconnaissance </a:t>
+            </a:r>
+            <a:r>
+              <a:rPr lang="fr-FR" sz="1800" dirty="0" smtClean="0"/>
+              <a:t>d’images</a:t>
+            </a:r>
+            <a:endParaRPr lang="fr-FR" sz="1800" dirty="0"/>
+          </a:p>
+          <a:p>
+            <a:endParaRPr lang="fr-FR" sz="1800" dirty="0"/>
+          </a:p>
+          <a:p>
+            <a:r>
+              <a:rPr lang="fr-FR" sz="1800" dirty="0" smtClean="0"/>
+              <a:t>Ecrire </a:t>
+            </a:r>
+            <a:r>
+              <a:rPr lang="fr-FR" sz="1800" dirty="0"/>
+              <a:t>un programme d'asservissement des roues du </a:t>
+            </a:r>
+            <a:r>
+              <a:rPr lang="fr-FR" sz="1800" dirty="0" smtClean="0"/>
+              <a:t>robot</a:t>
+            </a:r>
+          </a:p>
+          <a:p>
+            <a:pPr marL="0" indent="0">
+              <a:buNone/>
+            </a:pPr>
+            <a:endParaRPr lang="fr-FR" sz="1800" dirty="0"/>
+          </a:p>
+          <a:p>
+            <a:r>
+              <a:rPr lang="fr-FR" sz="1800" dirty="0" smtClean="0"/>
+              <a:t>Réaliser </a:t>
+            </a:r>
+            <a:r>
+              <a:rPr lang="fr-FR" sz="1800" dirty="0"/>
+              <a:t>une communication fonctionnelle entre la </a:t>
+            </a:r>
+            <a:r>
+              <a:rPr lang="fr-FR" sz="1800" dirty="0" err="1"/>
+              <a:t>Raspberry</a:t>
+            </a:r>
+            <a:r>
+              <a:rPr lang="fr-FR" sz="1800" dirty="0"/>
+              <a:t> Pi et le </a:t>
+            </a:r>
+            <a:r>
+              <a:rPr lang="fr-FR" sz="1800" dirty="0" smtClean="0"/>
+              <a:t>microcontrôleur </a:t>
+            </a:r>
+            <a:r>
+              <a:rPr lang="fr-FR" sz="1800" dirty="0" err="1" smtClean="0"/>
+              <a:t>dsPIC</a:t>
+            </a:r>
+            <a:endParaRPr lang="fr-FR" sz="1800" dirty="0"/>
+          </a:p>
+          <a:p>
+            <a:endParaRPr lang="fr-FR" sz="1800" dirty="0"/>
+          </a:p>
+          <a:p>
+            <a:r>
+              <a:rPr lang="fr-FR" sz="1800" dirty="0" smtClean="0"/>
+              <a:t>Prise </a:t>
+            </a:r>
+            <a:r>
+              <a:rPr lang="fr-FR" sz="1800" dirty="0"/>
+              <a:t>en main des outils</a:t>
+            </a:r>
+            <a:endParaRPr lang="fr-FR" sz="1800" dirty="0"/>
+          </a:p>
+        </p:txBody>
+      </p:sp>
+      <p:sp>
+        <p:nvSpPr>
+          <p:cNvPr id="4" name="Espace réservé du texte 3"/>
+          <p:cNvSpPr>
+            <a:spLocks noGrp="1"/>
+          </p:cNvSpPr>
+          <p:nvPr>
+            <p:ph type="body" sz="quarter" idx="13"/>
+          </p:nvPr>
+        </p:nvSpPr>
+        <p:spPr/>
+        <p:txBody>
+          <a:bodyPr/>
+          <a:lstStyle/>
+          <a:p>
+            <a:r>
+              <a:rPr lang="fr-FR" dirty="0"/>
+              <a:t>Présentation du </a:t>
+            </a:r>
+            <a:r>
+              <a:rPr lang="fr-FR" dirty="0" smtClean="0"/>
+              <a:t>sujet : </a:t>
+            </a:r>
+            <a:r>
+              <a:rPr lang="fr-FR" dirty="0" smtClean="0"/>
+              <a:t>nos objectifs</a:t>
+            </a:r>
+            <a:endParaRPr lang="fr-FR" dirty="0"/>
+          </a:p>
+        </p:txBody>
+      </p:sp>
+    </p:spTree>
+    <p:extLst>
+      <p:ext uri="{BB962C8B-B14F-4D97-AF65-F5344CB8AC3E}">
+        <p14:creationId xmlns:p14="http://schemas.microsoft.com/office/powerpoint/2010/main" val="1881845159"/>
+      </p:ext>
+    </p:extLst>
+  </p:cSld>
+  <p:clrMapOvr>
+    <a:masterClrMapping/>
+  </p:clrMapOvr>
+</p:sld>
+</file>
+
+<file path=ppt/slides/slide4.xml><?xml version="1.0" encoding="utf-8"?>
+<p:sld xmlns:a="http://schemas.openxmlformats.org/drawingml/2006/main" xmlns:r="http://schemas.openxmlformats.org/officeDocument/2006/relationships" xmlns:p="http://schemas.openxmlformats.org/presentationml/2006/main">
+  <p:cSld>
+    <p:spTree>
+      <p:nvGrpSpPr>
+        <p:cNvPr id="1" name=""/>
+        <p:cNvGrpSpPr/>
+        <p:nvPr/>
+      </p:nvGrpSpPr>
+      <p:grpSpPr>
+        <a:xfrm>
+          <a:off x="0" y="0"/>
+          <a:ext cx="0" cy="0"/>
+          <a:chOff x="0" y="0"/>
+          <a:chExt cx="0" cy="0"/>
+        </a:xfrm>
+      </p:grpSpPr>
+      <p:sp>
+        <p:nvSpPr>
+          <p:cNvPr id="2" name="Titre 1"/>
+          <p:cNvSpPr>
+            <a:spLocks noGrp="1"/>
+          </p:cNvSpPr>
+          <p:nvPr>
+            <p:ph type="title"/>
+          </p:nvPr>
+        </p:nvSpPr>
+        <p:spPr/>
+        <p:txBody>
+          <a:bodyPr>
+            <a:normAutofit fontScale="90000"/>
+          </a:bodyPr>
+          <a:lstStyle/>
+          <a:p>
+            <a:r>
+              <a:rPr lang="fr-FR" dirty="0" smtClean="0"/>
+              <a:t>Algorithme de reconnaissance d’images (</a:t>
+            </a:r>
+            <a:r>
+              <a:rPr lang="fr-FR" dirty="0" err="1" smtClean="0"/>
+              <a:t>TensorFlow</a:t>
+            </a:r>
+            <a:r>
+              <a:rPr lang="fr-FR" dirty="0" smtClean="0"/>
+              <a:t>)</a:t>
+            </a:r>
+            <a:endParaRPr lang="fr-FR" dirty="0"/>
+          </a:p>
+        </p:txBody>
+      </p:sp>
+      <p:sp>
+        <p:nvSpPr>
+          <p:cNvPr id="3" name="Sous-titre 2"/>
+          <p:cNvSpPr>
+            <a:spLocks noGrp="1"/>
+          </p:cNvSpPr>
+          <p:nvPr>
+            <p:ph type="subTitle" idx="13"/>
+          </p:nvPr>
+        </p:nvSpPr>
+        <p:spPr/>
+        <p:txBody>
+          <a:bodyPr/>
+          <a:lstStyle/>
+          <a:p>
+            <a:r>
+              <a:rPr lang="fr-FR" dirty="0"/>
+              <a:t>Etape 2</a:t>
+            </a:r>
+          </a:p>
+        </p:txBody>
+      </p:sp>
+    </p:spTree>
+    <p:extLst>
+      <p:ext uri="{BB962C8B-B14F-4D97-AF65-F5344CB8AC3E}">
+        <p14:creationId xmlns:p14="http://schemas.microsoft.com/office/powerpoint/2010/main" val="585543990"/>
+      </p:ext>
+    </p:extLst>
+  </p:cSld>
+  <p:clrMapOvr>
+    <a:masterClrMapping/>
+  </p:clrMapOvr>
+</p:sld>
+</file>
+
+<file path=ppt/slides/slide5.xml><?xml version="1.0" encoding="utf-8"?>
+<p:sld xmlns:a="http://schemas.openxmlformats.org/drawingml/2006/main" xmlns:r="http://schemas.openxmlformats.org/officeDocument/2006/relationships" xmlns:p="http://schemas.openxmlformats.org/presentationml/2006/main">
+  <p:cSld>
+    <p:spTree>
+      <p:nvGrpSpPr>
+        <p:cNvPr id="1" name=""/>
+        <p:cNvGrpSpPr/>
+        <p:nvPr/>
+      </p:nvGrpSpPr>
+      <p:grpSpPr>
+        <a:xfrm>
+          <a:off x="0" y="0"/>
+          <a:ext cx="0" cy="0"/>
+          <a:chOff x="0" y="0"/>
+          <a:chExt cx="0" cy="0"/>
+        </a:xfrm>
+      </p:grpSpPr>
+      <p:sp>
+        <p:nvSpPr>
+          <p:cNvPr id="2" name="Titre 1"/>
+          <p:cNvSpPr>
+            <a:spLocks noGrp="1"/>
+          </p:cNvSpPr>
+          <p:nvPr>
+            <p:ph type="title"/>
+          </p:nvPr>
+        </p:nvSpPr>
+        <p:spPr/>
+        <p:txBody>
+          <a:bodyPr/>
+          <a:lstStyle/>
+          <a:p>
+            <a:r>
+              <a:rPr lang="fr-FR" dirty="0" err="1"/>
+              <a:t>Raspberry</a:t>
+            </a:r>
+            <a:r>
+              <a:rPr lang="fr-FR" dirty="0"/>
+              <a:t> Pi</a:t>
+            </a:r>
+          </a:p>
+        </p:txBody>
+      </p:sp>
+      <p:sp>
+        <p:nvSpPr>
+          <p:cNvPr id="3" name="Sous-titre 2"/>
+          <p:cNvSpPr>
+            <a:spLocks noGrp="1"/>
+          </p:cNvSpPr>
+          <p:nvPr>
+            <p:ph type="subTitle" idx="13"/>
+          </p:nvPr>
+        </p:nvSpPr>
+        <p:spPr/>
+        <p:txBody>
+          <a:bodyPr/>
+          <a:lstStyle/>
+          <a:p>
+            <a:r>
+              <a:rPr lang="fr-FR" dirty="0" smtClean="0"/>
+              <a:t>Etape 3</a:t>
+            </a:r>
+            <a:endParaRPr lang="fr-FR" dirty="0"/>
+          </a:p>
+        </p:txBody>
+      </p:sp>
+    </p:spTree>
+    <p:extLst>
+      <p:ext uri="{BB962C8B-B14F-4D97-AF65-F5344CB8AC3E}">
+        <p14:creationId xmlns:p14="http://schemas.microsoft.com/office/powerpoint/2010/main" val="4015692847"/>
+      </p:ext>
+    </p:extLst>
+  </p:cSld>
+  <p:clrMapOvr>
+    <a:masterClrMapping/>
+  </p:clrMapOvr>
+</p:sld>
+</file>
+
+<file path=ppt/slides/slide6.xml><?xml version="1.0" encoding="utf-8"?>
+<p:sld xmlns:a="http://schemas.openxmlformats.org/drawingml/2006/main" xmlns:r="http://schemas.openxmlformats.org/officeDocument/2006/relationships" xmlns:p="http://schemas.openxmlformats.org/presentationml/2006/main">
+  <p:cSld>
+    <p:spTree>
+      <p:nvGrpSpPr>
+        <p:cNvPr id="1" name=""/>
+        <p:cNvGrpSpPr/>
+        <p:nvPr/>
+      </p:nvGrpSpPr>
+      <p:grpSpPr>
+        <a:xfrm>
+          <a:off x="0" y="0"/>
+          <a:ext cx="0" cy="0"/>
+          <a:chOff x="0" y="0"/>
+          <a:chExt cx="0" cy="0"/>
+        </a:xfrm>
+      </p:grpSpPr>
+      <p:sp>
+        <p:nvSpPr>
+          <p:cNvPr id="2" name="Titre 1"/>
+          <p:cNvSpPr>
+            <a:spLocks noGrp="1"/>
+          </p:cNvSpPr>
+          <p:nvPr>
+            <p:ph type="title"/>
+          </p:nvPr>
+        </p:nvSpPr>
+        <p:spPr/>
+        <p:txBody>
+          <a:bodyPr/>
+          <a:lstStyle/>
+          <a:p>
+            <a:r>
+              <a:rPr lang="fr-FR" dirty="0" smtClean="0"/>
+              <a:t>Contrôle moteur</a:t>
+            </a:r>
+            <a:endParaRPr lang="fr-FR" dirty="0"/>
+          </a:p>
+        </p:txBody>
+      </p:sp>
+      <p:sp>
+        <p:nvSpPr>
+          <p:cNvPr id="3" name="Sous-titre 2"/>
+          <p:cNvSpPr>
+            <a:spLocks noGrp="1"/>
+          </p:cNvSpPr>
+          <p:nvPr>
+            <p:ph type="subTitle" idx="13"/>
+          </p:nvPr>
+        </p:nvSpPr>
+        <p:spPr/>
+        <p:txBody>
+          <a:bodyPr/>
+          <a:lstStyle/>
+          <a:p>
+            <a:r>
+              <a:rPr lang="fr-FR" dirty="0" smtClean="0"/>
+              <a:t>Etape 4</a:t>
+            </a:r>
+            <a:endParaRPr lang="fr-FR" dirty="0"/>
+          </a:p>
+        </p:txBody>
+      </p:sp>
+    </p:spTree>
+    <p:extLst>
+      <p:ext uri="{BB962C8B-B14F-4D97-AF65-F5344CB8AC3E}">
+        <p14:creationId xmlns:p14="http://schemas.microsoft.com/office/powerpoint/2010/main" val="236959479"/>
+      </p:ext>
+    </p:extLst>
+  </p:cSld>
+  <p:clrMapOvr>
+    <a:masterClrMapping/>
+  </p:clrMapOvr>
+</p:sld>
+</file>
+
+<file path=ppt/slides/slide7.xml><?xml version="1.0" encoding="utf-8"?>
+<p:sld xmlns:a="http://schemas.openxmlformats.org/drawingml/2006/main" xmlns:r="http://schemas.openxmlformats.org/officeDocument/2006/relationships" xmlns:p="http://schemas.openxmlformats.org/presentationml/2006/main">
+  <p:cSld>
+    <p:spTree>
+      <p:nvGrpSpPr>
+        <p:cNvPr id="1" name=""/>
+        <p:cNvGrpSpPr/>
+        <p:nvPr/>
+      </p:nvGrpSpPr>
+      <p:grpSpPr>
+        <a:xfrm>
+          <a:off x="0" y="0"/>
+          <a:ext cx="0" cy="0"/>
+          <a:chOff x="0" y="0"/>
+          <a:chExt cx="0" cy="0"/>
+        </a:xfrm>
+      </p:grpSpPr>
+      <p:sp>
+        <p:nvSpPr>
+          <p:cNvPr id="2" name="Titre 1"/>
+          <p:cNvSpPr>
+            <a:spLocks noGrp="1"/>
+          </p:cNvSpPr>
+          <p:nvPr>
+            <p:ph type="title"/>
+          </p:nvPr>
+        </p:nvSpPr>
+        <p:spPr/>
+        <p:txBody>
+          <a:bodyPr/>
+          <a:lstStyle/>
+          <a:p>
+            <a:r>
+              <a:rPr lang="fr-FR" dirty="0" smtClean="0"/>
+              <a:t>Communication UART</a:t>
+            </a:r>
+            <a:endParaRPr lang="fr-FR" dirty="0"/>
+          </a:p>
+        </p:txBody>
+      </p:sp>
+      <p:sp>
+        <p:nvSpPr>
+          <p:cNvPr id="3" name="Sous-titre 2"/>
+          <p:cNvSpPr>
+            <a:spLocks noGrp="1"/>
+          </p:cNvSpPr>
+          <p:nvPr>
+            <p:ph type="subTitle" idx="13"/>
+          </p:nvPr>
+        </p:nvSpPr>
+        <p:spPr/>
+        <p:txBody>
+          <a:bodyPr/>
+          <a:lstStyle/>
+          <a:p>
+            <a:r>
+              <a:rPr lang="fr-FR" dirty="0" smtClean="0"/>
+              <a:t>Etape 5</a:t>
+            </a:r>
+            <a:endParaRPr lang="fr-FR" dirty="0"/>
+          </a:p>
+        </p:txBody>
+      </p:sp>
+    </p:spTree>
+    <p:extLst>
+      <p:ext uri="{BB962C8B-B14F-4D97-AF65-F5344CB8AC3E}">
+        <p14:creationId xmlns:p14="http://schemas.microsoft.com/office/powerpoint/2010/main" val="1444035438"/>
+      </p:ext>
+    </p:extLst>
+  </p:cSld>
+  <p:clrMapOvr>
+    <a:masterClrMapping/>
+  </p:clrMapOvr>
+</p:sld>
+</file>
+
+<file path=ppt/slides/slide8.xml><?xml version="1.0" encoding="utf-8"?>
+<p:sld xmlns:a="http://schemas.openxmlformats.org/drawingml/2006/main" xmlns:r="http://schemas.openxmlformats.org/officeDocument/2006/relationships" xmlns:p="http://schemas.openxmlformats.org/presentationml/2006/main">
+  <p:cSld>
+    <p:spTree>
+      <p:nvGrpSpPr>
+        <p:cNvPr id="1" name=""/>
+        <p:cNvGrpSpPr/>
+        <p:nvPr/>
+      </p:nvGrpSpPr>
+      <p:grpSpPr>
+        <a:xfrm>
+          <a:off x="0" y="0"/>
+          <a:ext cx="0" cy="0"/>
+          <a:chOff x="0" y="0"/>
+          <a:chExt cx="0" cy="0"/>
+        </a:xfrm>
+      </p:grpSpPr>
+      <p:sp>
+        <p:nvSpPr>
+          <p:cNvPr id="2" name="Titre 1"/>
+          <p:cNvSpPr>
+            <a:spLocks noGrp="1"/>
+          </p:cNvSpPr>
+          <p:nvPr>
+            <p:ph type="title"/>
+          </p:nvPr>
+        </p:nvSpPr>
+        <p:spPr/>
+        <p:txBody>
+          <a:bodyPr/>
+          <a:lstStyle/>
+          <a:p>
+            <a:r>
+              <a:rPr lang="fr-FR" dirty="0" smtClean="0"/>
+              <a:t>Asservissement des roues</a:t>
+            </a:r>
+            <a:endParaRPr lang="fr-FR" dirty="0"/>
+          </a:p>
+        </p:txBody>
+      </p:sp>
+      <p:sp>
+        <p:nvSpPr>
+          <p:cNvPr id="3" name="Sous-titre 2"/>
+          <p:cNvSpPr>
+            <a:spLocks noGrp="1"/>
+          </p:cNvSpPr>
+          <p:nvPr>
+            <p:ph type="subTitle" idx="13"/>
+          </p:nvPr>
+        </p:nvSpPr>
+        <p:spPr/>
+        <p:txBody>
+          <a:bodyPr/>
+          <a:lstStyle/>
+          <a:p>
+            <a:r>
+              <a:rPr lang="fr-FR" dirty="0" smtClean="0"/>
+              <a:t>Etape 6</a:t>
+            </a:r>
+            <a:endParaRPr lang="fr-FR" dirty="0"/>
+          </a:p>
+        </p:txBody>
+      </p:sp>
+    </p:spTree>
+    <p:extLst>
+      <p:ext uri="{BB962C8B-B14F-4D97-AF65-F5344CB8AC3E}">
+        <p14:creationId xmlns:p14="http://schemas.microsoft.com/office/powerpoint/2010/main" val="495909710"/>
+      </p:ext>
+    </p:extLst>
+  </p:cSld>
+  <p:clrMapOvr>
+    <a:masterClrMapping/>
+  </p:clrMapOvr>
+</p:sld>
+</file>
+
+<file path=ppt/slides/slide9.xml><?xml version="1.0" encoding="utf-8"?>
+<p:sld xmlns:a="http://schemas.openxmlformats.org/drawingml/2006/main" xmlns:r="http://schemas.openxmlformats.org/officeDocument/2006/relationships" xmlns:p="http://schemas.openxmlformats.org/presentationml/2006/main">
+  <p:cSld>
+    <p:spTree>
+      <p:nvGrpSpPr>
+        <p:cNvPr id="1" name=""/>
+        <p:cNvGrpSpPr/>
+        <p:nvPr/>
+      </p:nvGrpSpPr>
+      <p:grpSpPr>
+        <a:xfrm>
+          <a:off x="0" y="0"/>
+          <a:ext cx="0" cy="0"/>
+          <a:chOff x="0" y="0"/>
+          <a:chExt cx="0" cy="0"/>
+        </a:xfrm>
+      </p:grpSpPr>
+      <p:sp>
+        <p:nvSpPr>
+          <p:cNvPr id="2" name="Titre 1"/>
+          <p:cNvSpPr>
+            <a:spLocks noGrp="1"/>
+          </p:cNvSpPr>
+          <p:nvPr>
+            <p:ph type="title"/>
+          </p:nvPr>
+        </p:nvSpPr>
+        <p:spPr/>
+        <p:txBody>
+          <a:bodyPr/>
+          <a:lstStyle/>
+          <a:p>
+            <a:r>
+              <a:rPr lang="fr-FR" dirty="0" smtClean="0"/>
+              <a:t>Conclusion</a:t>
+            </a:r>
+            <a:endParaRPr lang="fr-FR" dirty="0"/>
+          </a:p>
+        </p:txBody>
+      </p:sp>
+      <p:sp>
+        <p:nvSpPr>
+          <p:cNvPr id="3" name="Sous-titre 2"/>
+          <p:cNvSpPr>
+            <a:spLocks noGrp="1"/>
+          </p:cNvSpPr>
+          <p:nvPr>
+            <p:ph type="subTitle" idx="13"/>
+          </p:nvPr>
+        </p:nvSpPr>
+        <p:spPr/>
+        <p:txBody>
+          <a:bodyPr/>
+          <a:lstStyle/>
+          <a:p>
+            <a:r>
+              <a:rPr lang="fr-FR" dirty="0" smtClean="0"/>
+              <a:t>Etape 7</a:t>
+            </a:r>
+            <a:endParaRPr lang="fr-FR" dirty="0"/>
+          </a:p>
+        </p:txBody>
+      </p:sp>
+    </p:spTree>
+    <p:extLst>
+      <p:ext uri="{BB962C8B-B14F-4D97-AF65-F5344CB8AC3E}">
+        <p14:creationId xmlns:p14="http://schemas.microsoft.com/office/powerpoint/2010/main" val="4186378593"/>
       </p:ext>
     </p:extLst>
   </p:cSld>

</xml_diff>